<commit_message>
fix typo in slides
</commit_message>
<xml_diff>
--- a/02-languages/01-teoria/01 Introducción a Javascript.pptx
+++ b/02-languages/01-teoria/01 Introducción a Javascript.pptx
@@ -2211,7 +2211,7 @@
           </a:ln>
           <a:extLst>
             <a:ext uri="{C572A759-6A51-4108-AA02-DFA0A04FC94B}">
-              <ma14:wrappingTextBoxFlag xmlns="" xmlns:m="http://schemas.openxmlformats.org/officeDocument/2006/math" xmlns:a14="http://schemas.microsoft.com/office/drawing/2010/main" xmlns:ma14="http://schemas.microsoft.com/office/mac/drawingml/2011/main" val="1"/>
+              <ma14:wrappingTextBoxFlag xmlns:ma14="http://schemas.microsoft.com/office/mac/drawingml/2011/main" xmlns:a14="http://schemas.microsoft.com/office/drawing/2010/main" xmlns:m="http://schemas.openxmlformats.org/officeDocument/2006/math" xmlns="" val="1"/>
             </a:ext>
           </a:extLst>
         </p:spPr>
@@ -2250,7 +2250,7 @@
           </a:ln>
           <a:extLst>
             <a:ext uri="{C572A759-6A51-4108-AA02-DFA0A04FC94B}">
-              <ma14:wrappingTextBoxFlag xmlns="" xmlns:m="http://schemas.openxmlformats.org/officeDocument/2006/math" xmlns:a14="http://schemas.microsoft.com/office/drawing/2010/main" xmlns:ma14="http://schemas.microsoft.com/office/mac/drawingml/2011/main" val="1"/>
+              <ma14:wrappingTextBoxFlag xmlns:ma14="http://schemas.microsoft.com/office/mac/drawingml/2011/main" xmlns:a14="http://schemas.microsoft.com/office/drawing/2010/main" xmlns:m="http://schemas.openxmlformats.org/officeDocument/2006/math" xmlns="" val="1"/>
             </a:ext>
           </a:extLst>
         </p:spPr>
@@ -3208,7 +3208,7 @@
           </a:ln>
           <a:extLst>
             <a:ext uri="{C572A759-6A51-4108-AA02-DFA0A04FC94B}">
-              <ma14:wrappingTextBoxFlag xmlns="" xmlns:m="http://schemas.openxmlformats.org/officeDocument/2006/math" xmlns:a14="http://schemas.microsoft.com/office/drawing/2010/main" xmlns:ma14="http://schemas.microsoft.com/office/mac/drawingml/2011/main" val="1"/>
+              <ma14:wrappingTextBoxFlag xmlns:ma14="http://schemas.microsoft.com/office/mac/drawingml/2011/main" xmlns:a14="http://schemas.microsoft.com/office/drawing/2010/main" xmlns:m="http://schemas.openxmlformats.org/officeDocument/2006/math" xmlns="" val="1"/>
             </a:ext>
           </a:extLst>
         </p:spPr>
@@ -3258,7 +3258,7 @@
           </a:ln>
           <a:extLst>
             <a:ext uri="{C572A759-6A51-4108-AA02-DFA0A04FC94B}">
-              <ma14:wrappingTextBoxFlag xmlns="" xmlns:m="http://schemas.openxmlformats.org/officeDocument/2006/math" xmlns:a14="http://schemas.microsoft.com/office/drawing/2010/main" xmlns:ma14="http://schemas.microsoft.com/office/mac/drawingml/2011/main" val="1"/>
+              <ma14:wrappingTextBoxFlag xmlns:ma14="http://schemas.microsoft.com/office/mac/drawingml/2011/main" xmlns:a14="http://schemas.microsoft.com/office/drawing/2010/main" xmlns:m="http://schemas.openxmlformats.org/officeDocument/2006/math" xmlns="" val="1"/>
             </a:ext>
           </a:extLst>
         </p:spPr>
@@ -3527,7 +3527,7 @@
             <a:effectLst/>
             <a:extLst>
               <a:ext uri="{C572A759-6A51-4108-AA02-DFA0A04FC94B}">
-                <ma14:wrappingTextBoxFlag xmlns="" xmlns:m="http://schemas.openxmlformats.org/officeDocument/2006/math" xmlns:a14="http://schemas.microsoft.com/office/drawing/2010/main" xmlns:ma14="http://schemas.microsoft.com/office/mac/drawingml/2011/main" val="1"/>
+                <ma14:wrappingTextBoxFlag xmlns:ma14="http://schemas.microsoft.com/office/mac/drawingml/2011/main" xmlns:a14="http://schemas.microsoft.com/office/drawing/2010/main" xmlns:m="http://schemas.openxmlformats.org/officeDocument/2006/math" xmlns="" val="1"/>
               </a:ext>
             </a:extLst>
           </p:spPr>
@@ -3640,7 +3640,7 @@
             <a:effectLst/>
             <a:extLst>
               <a:ext uri="{C572A759-6A51-4108-AA02-DFA0A04FC94B}">
-                <ma14:wrappingTextBoxFlag xmlns="" xmlns:m="http://schemas.openxmlformats.org/officeDocument/2006/math" xmlns:a14="http://schemas.microsoft.com/office/drawing/2010/main" xmlns:ma14="http://schemas.microsoft.com/office/mac/drawingml/2011/main" val="1"/>
+                <ma14:wrappingTextBoxFlag xmlns:ma14="http://schemas.microsoft.com/office/mac/drawingml/2011/main" xmlns:a14="http://schemas.microsoft.com/office/drawing/2010/main" xmlns:m="http://schemas.openxmlformats.org/officeDocument/2006/math" xmlns="" val="1"/>
               </a:ext>
             </a:extLst>
           </p:spPr>
@@ -3755,7 +3755,7 @@
             <a:effectLst/>
             <a:extLst>
               <a:ext uri="{C572A759-6A51-4108-AA02-DFA0A04FC94B}">
-                <ma14:wrappingTextBoxFlag xmlns="" xmlns:m="http://schemas.openxmlformats.org/officeDocument/2006/math" xmlns:a14="http://schemas.microsoft.com/office/drawing/2010/main" xmlns:ma14="http://schemas.microsoft.com/office/mac/drawingml/2011/main" val="1"/>
+                <ma14:wrappingTextBoxFlag xmlns:ma14="http://schemas.microsoft.com/office/mac/drawingml/2011/main" xmlns:a14="http://schemas.microsoft.com/office/drawing/2010/main" xmlns:m="http://schemas.openxmlformats.org/officeDocument/2006/math" xmlns="" val="1"/>
               </a:ext>
             </a:extLst>
           </p:spPr>
@@ -3866,7 +3866,7 @@
             <a:effectLst/>
             <a:extLst>
               <a:ext uri="{C572A759-6A51-4108-AA02-DFA0A04FC94B}">
-                <ma14:wrappingTextBoxFlag xmlns="" xmlns:m="http://schemas.openxmlformats.org/officeDocument/2006/math" xmlns:a14="http://schemas.microsoft.com/office/drawing/2010/main" xmlns:ma14="http://schemas.microsoft.com/office/mac/drawingml/2011/main" val="1"/>
+                <ma14:wrappingTextBoxFlag xmlns:ma14="http://schemas.microsoft.com/office/mac/drawingml/2011/main" xmlns:a14="http://schemas.microsoft.com/office/drawing/2010/main" xmlns:m="http://schemas.openxmlformats.org/officeDocument/2006/math" xmlns="" val="1"/>
               </a:ext>
             </a:extLst>
           </p:spPr>
@@ -3980,7 +3980,7 @@
             <a:effectLst/>
             <a:extLst>
               <a:ext uri="{C572A759-6A51-4108-AA02-DFA0A04FC94B}">
-                <ma14:wrappingTextBoxFlag xmlns="" xmlns:m="http://schemas.openxmlformats.org/officeDocument/2006/math" xmlns:a14="http://schemas.microsoft.com/office/drawing/2010/main" xmlns:ma14="http://schemas.microsoft.com/office/mac/drawingml/2011/main" val="1"/>
+                <ma14:wrappingTextBoxFlag xmlns:ma14="http://schemas.microsoft.com/office/mac/drawingml/2011/main" xmlns:a14="http://schemas.microsoft.com/office/drawing/2010/main" xmlns:m="http://schemas.openxmlformats.org/officeDocument/2006/math" xmlns="" val="1"/>
               </a:ext>
             </a:extLst>
           </p:spPr>
@@ -4091,7 +4091,7 @@
             <a:effectLst/>
             <a:extLst>
               <a:ext uri="{C572A759-6A51-4108-AA02-DFA0A04FC94B}">
-                <ma14:wrappingTextBoxFlag xmlns="" xmlns:m="http://schemas.openxmlformats.org/officeDocument/2006/math" xmlns:a14="http://schemas.microsoft.com/office/drawing/2010/main" xmlns:ma14="http://schemas.microsoft.com/office/mac/drawingml/2011/main" val="1"/>
+                <ma14:wrappingTextBoxFlag xmlns:ma14="http://schemas.microsoft.com/office/mac/drawingml/2011/main" xmlns:a14="http://schemas.microsoft.com/office/drawing/2010/main" xmlns:m="http://schemas.openxmlformats.org/officeDocument/2006/math" xmlns="" val="1"/>
               </a:ext>
             </a:extLst>
           </p:spPr>
@@ -4278,7 +4278,7 @@
           </a:ln>
           <a:extLst>
             <a:ext uri="{C572A759-6A51-4108-AA02-DFA0A04FC94B}">
-              <ma14:wrappingTextBoxFlag xmlns="" xmlns:m="http://schemas.openxmlformats.org/officeDocument/2006/math" xmlns:a14="http://schemas.microsoft.com/office/drawing/2010/main" xmlns:ma14="http://schemas.microsoft.com/office/mac/drawingml/2011/main" val="1"/>
+              <ma14:wrappingTextBoxFlag xmlns:ma14="http://schemas.microsoft.com/office/mac/drawingml/2011/main" xmlns:a14="http://schemas.microsoft.com/office/drawing/2010/main" xmlns:m="http://schemas.openxmlformats.org/officeDocument/2006/math" xmlns="" val="1"/>
             </a:ext>
           </a:extLst>
         </p:spPr>
@@ -4334,7 +4334,7 @@
           </a:ln>
           <a:extLst>
             <a:ext uri="{C572A759-6A51-4108-AA02-DFA0A04FC94B}">
-              <ma14:wrappingTextBoxFlag xmlns="" xmlns:m="http://schemas.openxmlformats.org/officeDocument/2006/math" xmlns:a14="http://schemas.microsoft.com/office/drawing/2010/main" xmlns:ma14="http://schemas.microsoft.com/office/mac/drawingml/2011/main" val="1"/>
+              <ma14:wrappingTextBoxFlag xmlns:ma14="http://schemas.microsoft.com/office/mac/drawingml/2011/main" xmlns:a14="http://schemas.microsoft.com/office/drawing/2010/main" xmlns:m="http://schemas.openxmlformats.org/officeDocument/2006/math" xmlns="" val="1"/>
             </a:ext>
           </a:extLst>
         </p:spPr>
@@ -4436,7 +4436,7 @@
           </a:ln>
           <a:extLst>
             <a:ext uri="{C572A759-6A51-4108-AA02-DFA0A04FC94B}">
-              <ma14:wrappingTextBoxFlag xmlns="" xmlns:m="http://schemas.openxmlformats.org/officeDocument/2006/math" xmlns:a14="http://schemas.microsoft.com/office/drawing/2010/main" xmlns:ma14="http://schemas.microsoft.com/office/mac/drawingml/2011/main" val="1"/>
+              <ma14:wrappingTextBoxFlag xmlns:ma14="http://schemas.microsoft.com/office/mac/drawingml/2011/main" xmlns:a14="http://schemas.microsoft.com/office/drawing/2010/main" xmlns:m="http://schemas.openxmlformats.org/officeDocument/2006/math" xmlns="" val="1"/>
             </a:ext>
           </a:extLst>
         </p:spPr>
@@ -4486,7 +4486,7 @@
           </a:ln>
           <a:extLst>
             <a:ext uri="{C572A759-6A51-4108-AA02-DFA0A04FC94B}">
-              <ma14:wrappingTextBoxFlag xmlns="" xmlns:m="http://schemas.openxmlformats.org/officeDocument/2006/math" xmlns:a14="http://schemas.microsoft.com/office/drawing/2010/main" xmlns:ma14="http://schemas.microsoft.com/office/mac/drawingml/2011/main" val="1"/>
+              <ma14:wrappingTextBoxFlag xmlns:ma14="http://schemas.microsoft.com/office/mac/drawingml/2011/main" xmlns:a14="http://schemas.microsoft.com/office/drawing/2010/main" xmlns:m="http://schemas.openxmlformats.org/officeDocument/2006/math" xmlns="" val="1"/>
             </a:ext>
           </a:extLst>
         </p:spPr>
@@ -4561,7 +4561,7 @@
           </a:ln>
           <a:extLst>
             <a:ext uri="{C572A759-6A51-4108-AA02-DFA0A04FC94B}">
-              <ma14:wrappingTextBoxFlag xmlns="" xmlns:m="http://schemas.openxmlformats.org/officeDocument/2006/math" xmlns:a14="http://schemas.microsoft.com/office/drawing/2010/main" xmlns:ma14="http://schemas.microsoft.com/office/mac/drawingml/2011/main" val="1"/>
+              <ma14:wrappingTextBoxFlag xmlns:ma14="http://schemas.microsoft.com/office/mac/drawingml/2011/main" xmlns:a14="http://schemas.microsoft.com/office/drawing/2010/main" xmlns:m="http://schemas.openxmlformats.org/officeDocument/2006/math" xmlns="" val="1"/>
             </a:ext>
           </a:extLst>
         </p:spPr>
@@ -4648,7 +4648,7 @@
           </a:ln>
           <a:extLst>
             <a:ext uri="{C572A759-6A51-4108-AA02-DFA0A04FC94B}">
-              <ma14:wrappingTextBoxFlag xmlns="" xmlns:m="http://schemas.openxmlformats.org/officeDocument/2006/math" xmlns:a14="http://schemas.microsoft.com/office/drawing/2010/main" xmlns:ma14="http://schemas.microsoft.com/office/mac/drawingml/2011/main" val="1"/>
+              <ma14:wrappingTextBoxFlag xmlns:ma14="http://schemas.microsoft.com/office/mac/drawingml/2011/main" xmlns:a14="http://schemas.microsoft.com/office/drawing/2010/main" xmlns:m="http://schemas.openxmlformats.org/officeDocument/2006/math" xmlns="" val="1"/>
             </a:ext>
           </a:extLst>
         </p:spPr>
@@ -4708,7 +4708,7 @@
           </a:ln>
           <a:extLst>
             <a:ext uri="{C572A759-6A51-4108-AA02-DFA0A04FC94B}">
-              <ma14:wrappingTextBoxFlag xmlns="" xmlns:m="http://schemas.openxmlformats.org/officeDocument/2006/math" xmlns:a14="http://schemas.microsoft.com/office/drawing/2010/main" xmlns:ma14="http://schemas.microsoft.com/office/mac/drawingml/2011/main" val="1"/>
+              <ma14:wrappingTextBoxFlag xmlns:ma14="http://schemas.microsoft.com/office/mac/drawingml/2011/main" xmlns:a14="http://schemas.microsoft.com/office/drawing/2010/main" xmlns:m="http://schemas.openxmlformats.org/officeDocument/2006/math" xmlns="" val="1"/>
             </a:ext>
           </a:extLst>
         </p:spPr>
@@ -4761,7 +4761,7 @@
           </a:ln>
           <a:extLst>
             <a:ext uri="{C572A759-6A51-4108-AA02-DFA0A04FC94B}">
-              <ma14:wrappingTextBoxFlag xmlns="" xmlns:m="http://schemas.openxmlformats.org/officeDocument/2006/math" xmlns:a14="http://schemas.microsoft.com/office/drawing/2010/main" xmlns:ma14="http://schemas.microsoft.com/office/mac/drawingml/2011/main" val="1"/>
+              <ma14:wrappingTextBoxFlag xmlns:ma14="http://schemas.microsoft.com/office/mac/drawingml/2011/main" xmlns:a14="http://schemas.microsoft.com/office/drawing/2010/main" xmlns:m="http://schemas.openxmlformats.org/officeDocument/2006/math" xmlns="" val="1"/>
             </a:ext>
           </a:extLst>
         </p:spPr>
@@ -4811,7 +4811,7 @@
           </a:ln>
           <a:extLst>
             <a:ext uri="{C572A759-6A51-4108-AA02-DFA0A04FC94B}">
-              <ma14:wrappingTextBoxFlag xmlns="" xmlns:m="http://schemas.openxmlformats.org/officeDocument/2006/math" xmlns:a14="http://schemas.microsoft.com/office/drawing/2010/main" xmlns:ma14="http://schemas.microsoft.com/office/mac/drawingml/2011/main" val="1"/>
+              <ma14:wrappingTextBoxFlag xmlns:ma14="http://schemas.microsoft.com/office/mac/drawingml/2011/main" xmlns:a14="http://schemas.microsoft.com/office/drawing/2010/main" xmlns:m="http://schemas.openxmlformats.org/officeDocument/2006/math" xmlns="" val="1"/>
             </a:ext>
           </a:extLst>
         </p:spPr>
@@ -4861,7 +4861,7 @@
           </a:ln>
           <a:extLst>
             <a:ext uri="{C572A759-6A51-4108-AA02-DFA0A04FC94B}">
-              <ma14:wrappingTextBoxFlag xmlns="" xmlns:m="http://schemas.openxmlformats.org/officeDocument/2006/math" xmlns:a14="http://schemas.microsoft.com/office/drawing/2010/main" xmlns:ma14="http://schemas.microsoft.com/office/mac/drawingml/2011/main" val="1"/>
+              <ma14:wrappingTextBoxFlag xmlns:ma14="http://schemas.microsoft.com/office/mac/drawingml/2011/main" xmlns:a14="http://schemas.microsoft.com/office/drawing/2010/main" xmlns:m="http://schemas.openxmlformats.org/officeDocument/2006/math" xmlns="" val="1"/>
             </a:ext>
           </a:extLst>
         </p:spPr>
@@ -5040,7 +5040,7 @@
             <a:effectLst/>
             <a:extLst>
               <a:ext uri="{C572A759-6A51-4108-AA02-DFA0A04FC94B}">
-                <ma14:wrappingTextBoxFlag xmlns="" xmlns:m="http://schemas.openxmlformats.org/officeDocument/2006/math" xmlns:a14="http://schemas.microsoft.com/office/drawing/2010/main" xmlns:ma14="http://schemas.microsoft.com/office/mac/drawingml/2011/main" val="1"/>
+                <ma14:wrappingTextBoxFlag xmlns:ma14="http://schemas.microsoft.com/office/mac/drawingml/2011/main" xmlns:a14="http://schemas.microsoft.com/office/drawing/2010/main" xmlns:m="http://schemas.openxmlformats.org/officeDocument/2006/math" xmlns="" val="1"/>
               </a:ext>
             </a:extLst>
           </p:spPr>
@@ -5092,7 +5092,7 @@
             <a:effectLst/>
             <a:extLst>
               <a:ext uri="{C572A759-6A51-4108-AA02-DFA0A04FC94B}">
-                <ma14:wrappingTextBoxFlag xmlns="" xmlns:m="http://schemas.openxmlformats.org/officeDocument/2006/math" xmlns:a14="http://schemas.microsoft.com/office/drawing/2010/main" xmlns:ma14="http://schemas.microsoft.com/office/mac/drawingml/2011/main" val="1"/>
+                <ma14:wrappingTextBoxFlag xmlns:ma14="http://schemas.microsoft.com/office/mac/drawingml/2011/main" xmlns:a14="http://schemas.microsoft.com/office/drawing/2010/main" xmlns:m="http://schemas.openxmlformats.org/officeDocument/2006/math" xmlns="" val="1"/>
               </a:ext>
             </a:extLst>
           </p:spPr>
@@ -5195,7 +5195,7 @@
             <a:effectLst/>
             <a:extLst>
               <a:ext uri="{C572A759-6A51-4108-AA02-DFA0A04FC94B}">
-                <ma14:wrappingTextBoxFlag xmlns="" xmlns:m="http://schemas.openxmlformats.org/officeDocument/2006/math" xmlns:a14="http://schemas.microsoft.com/office/drawing/2010/main" xmlns:ma14="http://schemas.microsoft.com/office/mac/drawingml/2011/main" val="1"/>
+                <ma14:wrappingTextBoxFlag xmlns:ma14="http://schemas.microsoft.com/office/mac/drawingml/2011/main" xmlns:a14="http://schemas.microsoft.com/office/drawing/2010/main" xmlns:m="http://schemas.openxmlformats.org/officeDocument/2006/math" xmlns="" val="1"/>
               </a:ext>
             </a:extLst>
           </p:spPr>
@@ -5245,7 +5245,7 @@
             <a:effectLst/>
             <a:extLst>
               <a:ext uri="{C572A759-6A51-4108-AA02-DFA0A04FC94B}">
-                <ma14:wrappingTextBoxFlag xmlns="" xmlns:m="http://schemas.openxmlformats.org/officeDocument/2006/math" xmlns:a14="http://schemas.microsoft.com/office/drawing/2010/main" xmlns:ma14="http://schemas.microsoft.com/office/mac/drawingml/2011/main" val="1"/>
+                <ma14:wrappingTextBoxFlag xmlns:ma14="http://schemas.microsoft.com/office/mac/drawingml/2011/main" xmlns:a14="http://schemas.microsoft.com/office/drawing/2010/main" xmlns:m="http://schemas.openxmlformats.org/officeDocument/2006/math" xmlns="" val="1"/>
               </a:ext>
             </a:extLst>
           </p:spPr>
@@ -5348,7 +5348,7 @@
             <a:effectLst/>
             <a:extLst>
               <a:ext uri="{C572A759-6A51-4108-AA02-DFA0A04FC94B}">
-                <ma14:wrappingTextBoxFlag xmlns="" xmlns:m="http://schemas.openxmlformats.org/officeDocument/2006/math" xmlns:a14="http://schemas.microsoft.com/office/drawing/2010/main" xmlns:ma14="http://schemas.microsoft.com/office/mac/drawingml/2011/main" val="1"/>
+                <ma14:wrappingTextBoxFlag xmlns:ma14="http://schemas.microsoft.com/office/mac/drawingml/2011/main" xmlns:a14="http://schemas.microsoft.com/office/drawing/2010/main" xmlns:m="http://schemas.openxmlformats.org/officeDocument/2006/math" xmlns="" val="1"/>
               </a:ext>
             </a:extLst>
           </p:spPr>
@@ -5397,7 +5397,7 @@
             <a:effectLst/>
             <a:extLst>
               <a:ext uri="{C572A759-6A51-4108-AA02-DFA0A04FC94B}">
-                <ma14:wrappingTextBoxFlag xmlns="" xmlns:m="http://schemas.openxmlformats.org/officeDocument/2006/math" xmlns:a14="http://schemas.microsoft.com/office/drawing/2010/main" xmlns:ma14="http://schemas.microsoft.com/office/mac/drawingml/2011/main" val="1"/>
+                <ma14:wrappingTextBoxFlag xmlns:ma14="http://schemas.microsoft.com/office/mac/drawingml/2011/main" xmlns:a14="http://schemas.microsoft.com/office/drawing/2010/main" xmlns:m="http://schemas.openxmlformats.org/officeDocument/2006/math" xmlns="" val="1"/>
               </a:ext>
             </a:extLst>
           </p:spPr>
@@ -5525,7 +5525,7 @@
             <a:effectLst/>
             <a:extLst>
               <a:ext uri="{C572A759-6A51-4108-AA02-DFA0A04FC94B}">
-                <ma14:wrappingTextBoxFlag xmlns="" xmlns:m="http://schemas.openxmlformats.org/officeDocument/2006/math" xmlns:a14="http://schemas.microsoft.com/office/drawing/2010/main" xmlns:ma14="http://schemas.microsoft.com/office/mac/drawingml/2011/main" val="1"/>
+                <ma14:wrappingTextBoxFlag xmlns:ma14="http://schemas.microsoft.com/office/mac/drawingml/2011/main" xmlns:a14="http://schemas.microsoft.com/office/drawing/2010/main" xmlns:m="http://schemas.openxmlformats.org/officeDocument/2006/math" xmlns="" val="1"/>
               </a:ext>
             </a:extLst>
           </p:spPr>
@@ -5575,7 +5575,7 @@
             <a:effectLst/>
             <a:extLst>
               <a:ext uri="{C572A759-6A51-4108-AA02-DFA0A04FC94B}">
-                <ma14:wrappingTextBoxFlag xmlns="" xmlns:m="http://schemas.openxmlformats.org/officeDocument/2006/math" xmlns:a14="http://schemas.microsoft.com/office/drawing/2010/main" xmlns:ma14="http://schemas.microsoft.com/office/mac/drawingml/2011/main" val="1"/>
+                <ma14:wrappingTextBoxFlag xmlns:ma14="http://schemas.microsoft.com/office/mac/drawingml/2011/main" xmlns:a14="http://schemas.microsoft.com/office/drawing/2010/main" xmlns:m="http://schemas.openxmlformats.org/officeDocument/2006/math" xmlns="" val="1"/>
               </a:ext>
             </a:extLst>
           </p:spPr>
@@ -5678,7 +5678,7 @@
             <a:effectLst/>
             <a:extLst>
               <a:ext uri="{C572A759-6A51-4108-AA02-DFA0A04FC94B}">
-                <ma14:wrappingTextBoxFlag xmlns="" xmlns:m="http://schemas.openxmlformats.org/officeDocument/2006/math" xmlns:a14="http://schemas.microsoft.com/office/drawing/2010/main" xmlns:ma14="http://schemas.microsoft.com/office/mac/drawingml/2011/main" val="1"/>
+                <ma14:wrappingTextBoxFlag xmlns:ma14="http://schemas.microsoft.com/office/mac/drawingml/2011/main" xmlns:a14="http://schemas.microsoft.com/office/drawing/2010/main" xmlns:m="http://schemas.openxmlformats.org/officeDocument/2006/math" xmlns="" val="1"/>
               </a:ext>
             </a:extLst>
           </p:spPr>
@@ -5728,7 +5728,7 @@
             <a:effectLst/>
             <a:extLst>
               <a:ext uri="{C572A759-6A51-4108-AA02-DFA0A04FC94B}">
-                <ma14:wrappingTextBoxFlag xmlns="" xmlns:m="http://schemas.openxmlformats.org/officeDocument/2006/math" xmlns:a14="http://schemas.microsoft.com/office/drawing/2010/main" xmlns:ma14="http://schemas.microsoft.com/office/mac/drawingml/2011/main" val="1"/>
+                <ma14:wrappingTextBoxFlag xmlns:ma14="http://schemas.microsoft.com/office/mac/drawingml/2011/main" xmlns:a14="http://schemas.microsoft.com/office/drawing/2010/main" xmlns:m="http://schemas.openxmlformats.org/officeDocument/2006/math" xmlns="" val="1"/>
               </a:ext>
             </a:extLst>
           </p:spPr>
@@ -5832,7 +5832,7 @@
             <a:effectLst/>
             <a:extLst>
               <a:ext uri="{C572A759-6A51-4108-AA02-DFA0A04FC94B}">
-                <ma14:wrappingTextBoxFlag xmlns="" xmlns:m="http://schemas.openxmlformats.org/officeDocument/2006/math" xmlns:a14="http://schemas.microsoft.com/office/drawing/2010/main" xmlns:ma14="http://schemas.microsoft.com/office/mac/drawingml/2011/main" val="1"/>
+                <ma14:wrappingTextBoxFlag xmlns:ma14="http://schemas.microsoft.com/office/mac/drawingml/2011/main" xmlns:a14="http://schemas.microsoft.com/office/drawing/2010/main" xmlns:m="http://schemas.openxmlformats.org/officeDocument/2006/math" xmlns="" val="1"/>
               </a:ext>
             </a:extLst>
           </p:spPr>
@@ -5882,7 +5882,7 @@
             <a:effectLst/>
             <a:extLst>
               <a:ext uri="{C572A759-6A51-4108-AA02-DFA0A04FC94B}">
-                <ma14:wrappingTextBoxFlag xmlns="" xmlns:m="http://schemas.openxmlformats.org/officeDocument/2006/math" xmlns:a14="http://schemas.microsoft.com/office/drawing/2010/main" xmlns:ma14="http://schemas.microsoft.com/office/mac/drawingml/2011/main" val="1"/>
+                <ma14:wrappingTextBoxFlag xmlns:ma14="http://schemas.microsoft.com/office/mac/drawingml/2011/main" xmlns:a14="http://schemas.microsoft.com/office/drawing/2010/main" xmlns:m="http://schemas.openxmlformats.org/officeDocument/2006/math" xmlns="" val="1"/>
               </a:ext>
             </a:extLst>
           </p:spPr>
@@ -5985,7 +5985,7 @@
             <a:effectLst/>
             <a:extLst>
               <a:ext uri="{C572A759-6A51-4108-AA02-DFA0A04FC94B}">
-                <ma14:wrappingTextBoxFlag xmlns="" xmlns:m="http://schemas.openxmlformats.org/officeDocument/2006/math" xmlns:a14="http://schemas.microsoft.com/office/drawing/2010/main" xmlns:ma14="http://schemas.microsoft.com/office/mac/drawingml/2011/main" val="1"/>
+                <ma14:wrappingTextBoxFlag xmlns:ma14="http://schemas.microsoft.com/office/mac/drawingml/2011/main" xmlns:a14="http://schemas.microsoft.com/office/drawing/2010/main" xmlns:m="http://schemas.openxmlformats.org/officeDocument/2006/math" xmlns="" val="1"/>
               </a:ext>
             </a:extLst>
           </p:spPr>
@@ -6035,7 +6035,7 @@
             <a:effectLst/>
             <a:extLst>
               <a:ext uri="{C572A759-6A51-4108-AA02-DFA0A04FC94B}">
-                <ma14:wrappingTextBoxFlag xmlns="" xmlns:m="http://schemas.openxmlformats.org/officeDocument/2006/math" xmlns:a14="http://schemas.microsoft.com/office/drawing/2010/main" xmlns:ma14="http://schemas.microsoft.com/office/mac/drawingml/2011/main" val="1"/>
+                <ma14:wrappingTextBoxFlag xmlns:ma14="http://schemas.microsoft.com/office/mac/drawingml/2011/main" xmlns:a14="http://schemas.microsoft.com/office/drawing/2010/main" xmlns:m="http://schemas.openxmlformats.org/officeDocument/2006/math" xmlns="" val="1"/>
               </a:ext>
             </a:extLst>
           </p:spPr>
@@ -6138,7 +6138,7 @@
             <a:effectLst/>
             <a:extLst>
               <a:ext uri="{C572A759-6A51-4108-AA02-DFA0A04FC94B}">
-                <ma14:wrappingTextBoxFlag xmlns="" xmlns:m="http://schemas.openxmlformats.org/officeDocument/2006/math" xmlns:a14="http://schemas.microsoft.com/office/drawing/2010/main" xmlns:ma14="http://schemas.microsoft.com/office/mac/drawingml/2011/main" val="1"/>
+                <ma14:wrappingTextBoxFlag xmlns:ma14="http://schemas.microsoft.com/office/mac/drawingml/2011/main" xmlns:a14="http://schemas.microsoft.com/office/drawing/2010/main" xmlns:m="http://schemas.openxmlformats.org/officeDocument/2006/math" xmlns="" val="1"/>
               </a:ext>
             </a:extLst>
           </p:spPr>
@@ -6188,7 +6188,7 @@
             <a:effectLst/>
             <a:extLst>
               <a:ext uri="{C572A759-6A51-4108-AA02-DFA0A04FC94B}">
-                <ma14:wrappingTextBoxFlag xmlns="" xmlns:m="http://schemas.openxmlformats.org/officeDocument/2006/math" xmlns:a14="http://schemas.microsoft.com/office/drawing/2010/main" xmlns:ma14="http://schemas.microsoft.com/office/mac/drawingml/2011/main" val="1"/>
+                <ma14:wrappingTextBoxFlag xmlns:ma14="http://schemas.microsoft.com/office/mac/drawingml/2011/main" xmlns:a14="http://schemas.microsoft.com/office/drawing/2010/main" xmlns:m="http://schemas.openxmlformats.org/officeDocument/2006/math" xmlns="" val="1"/>
               </a:ext>
             </a:extLst>
           </p:spPr>
@@ -6291,7 +6291,7 @@
             <a:effectLst/>
             <a:extLst>
               <a:ext uri="{C572A759-6A51-4108-AA02-DFA0A04FC94B}">
-                <ma14:wrappingTextBoxFlag xmlns="" xmlns:m="http://schemas.openxmlformats.org/officeDocument/2006/math" xmlns:a14="http://schemas.microsoft.com/office/drawing/2010/main" xmlns:ma14="http://schemas.microsoft.com/office/mac/drawingml/2011/main" val="1"/>
+                <ma14:wrappingTextBoxFlag xmlns:ma14="http://schemas.microsoft.com/office/mac/drawingml/2011/main" xmlns:a14="http://schemas.microsoft.com/office/drawing/2010/main" xmlns:m="http://schemas.openxmlformats.org/officeDocument/2006/math" xmlns="" val="1"/>
               </a:ext>
             </a:extLst>
           </p:spPr>
@@ -6340,7 +6340,7 @@
             <a:effectLst/>
             <a:extLst>
               <a:ext uri="{C572A759-6A51-4108-AA02-DFA0A04FC94B}">
-                <ma14:wrappingTextBoxFlag xmlns="" xmlns:m="http://schemas.openxmlformats.org/officeDocument/2006/math" xmlns:a14="http://schemas.microsoft.com/office/drawing/2010/main" xmlns:ma14="http://schemas.microsoft.com/office/mac/drawingml/2011/main" val="1"/>
+                <ma14:wrappingTextBoxFlag xmlns:ma14="http://schemas.microsoft.com/office/mac/drawingml/2011/main" xmlns:a14="http://schemas.microsoft.com/office/drawing/2010/main" xmlns:m="http://schemas.openxmlformats.org/officeDocument/2006/math" xmlns="" val="1"/>
               </a:ext>
             </a:extLst>
           </p:spPr>
@@ -6601,7 +6601,7 @@
             <a:effectLst/>
             <a:extLst>
               <a:ext uri="{C572A759-6A51-4108-AA02-DFA0A04FC94B}">
-                <ma14:wrappingTextBoxFlag xmlns="" xmlns:m="http://schemas.openxmlformats.org/officeDocument/2006/math" xmlns:a14="http://schemas.microsoft.com/office/drawing/2010/main" xmlns:ma14="http://schemas.microsoft.com/office/mac/drawingml/2011/main" val="1"/>
+                <ma14:wrappingTextBoxFlag xmlns:ma14="http://schemas.microsoft.com/office/mac/drawingml/2011/main" xmlns:a14="http://schemas.microsoft.com/office/drawing/2010/main" xmlns:m="http://schemas.openxmlformats.org/officeDocument/2006/math" xmlns="" val="1"/>
               </a:ext>
             </a:extLst>
           </p:spPr>
@@ -6744,7 +6744,7 @@
             <a:effectLst/>
             <a:extLst>
               <a:ext uri="{C572A759-6A51-4108-AA02-DFA0A04FC94B}">
-                <ma14:wrappingTextBoxFlag xmlns="" xmlns:m="http://schemas.openxmlformats.org/officeDocument/2006/math" xmlns:a14="http://schemas.microsoft.com/office/drawing/2010/main" xmlns:ma14="http://schemas.microsoft.com/office/mac/drawingml/2011/main" val="1"/>
+                <ma14:wrappingTextBoxFlag xmlns:ma14="http://schemas.microsoft.com/office/mac/drawingml/2011/main" xmlns:a14="http://schemas.microsoft.com/office/drawing/2010/main" xmlns:m="http://schemas.openxmlformats.org/officeDocument/2006/math" xmlns="" val="1"/>
               </a:ext>
             </a:extLst>
           </p:spPr>
@@ -6872,7 +6872,7 @@
               <a:effectLst/>
               <a:extLst>
                 <a:ext uri="{C572A759-6A51-4108-AA02-DFA0A04FC94B}">
-                  <ma14:wrappingTextBoxFlag xmlns="" xmlns:m="http://schemas.openxmlformats.org/officeDocument/2006/math" xmlns:a14="http://schemas.microsoft.com/office/drawing/2010/main" xmlns:ma14="http://schemas.microsoft.com/office/mac/drawingml/2011/main" val="1"/>
+                  <ma14:wrappingTextBoxFlag xmlns:ma14="http://schemas.microsoft.com/office/mac/drawingml/2011/main" xmlns:a14="http://schemas.microsoft.com/office/drawing/2010/main" xmlns:m="http://schemas.openxmlformats.org/officeDocument/2006/math" xmlns="" val="1"/>
                 </a:ext>
               </a:extLst>
             </p:spPr>
@@ -6984,7 +6984,7 @@
               <a:effectLst/>
               <a:extLst>
                 <a:ext uri="{C572A759-6A51-4108-AA02-DFA0A04FC94B}">
-                  <ma14:wrappingTextBoxFlag xmlns="" xmlns:m="http://schemas.openxmlformats.org/officeDocument/2006/math" xmlns:a14="http://schemas.microsoft.com/office/drawing/2010/main" xmlns:ma14="http://schemas.microsoft.com/office/mac/drawingml/2011/main" val="1"/>
+                  <ma14:wrappingTextBoxFlag xmlns:ma14="http://schemas.microsoft.com/office/mac/drawingml/2011/main" xmlns:a14="http://schemas.microsoft.com/office/drawing/2010/main" xmlns:m="http://schemas.openxmlformats.org/officeDocument/2006/math" xmlns="" val="1"/>
                 </a:ext>
               </a:extLst>
             </p:spPr>
@@ -7036,7 +7036,7 @@
             <a:effectLst/>
             <a:extLst>
               <a:ext uri="{C572A759-6A51-4108-AA02-DFA0A04FC94B}">
-                <ma14:wrappingTextBoxFlag xmlns="" xmlns:m="http://schemas.openxmlformats.org/officeDocument/2006/math" xmlns:a14="http://schemas.microsoft.com/office/drawing/2010/main" xmlns:ma14="http://schemas.microsoft.com/office/mac/drawingml/2011/main" val="1"/>
+                <ma14:wrappingTextBoxFlag xmlns:ma14="http://schemas.microsoft.com/office/mac/drawingml/2011/main" xmlns:a14="http://schemas.microsoft.com/office/drawing/2010/main" xmlns:m="http://schemas.openxmlformats.org/officeDocument/2006/math" xmlns="" val="1"/>
               </a:ext>
             </a:extLst>
           </p:spPr>
@@ -7079,9 +7079,9 @@
         <p:grpSpPr>
           <a:xfrm>
             <a:off x="4623808" y="2427786"/>
-            <a:ext cx="2907466" cy="280048"/>
+            <a:ext cx="3537698" cy="280048"/>
             <a:chOff x="0" y="0"/>
-            <a:chExt cx="2907465" cy="280047"/>
+            <a:chExt cx="3537697" cy="280047"/>
           </a:xfrm>
         </p:grpSpPr>
         <p:sp>
@@ -7143,7 +7143,7 @@
           <p:spPr>
             <a:xfrm>
               <a:off x="803175" y="3051"/>
-              <a:ext cx="2104290" cy="276996"/>
+              <a:ext cx="2734522" cy="276996"/>
             </a:xfrm>
             <a:prstGeom prst="rect">
               <a:avLst/>
@@ -7158,7 +7158,7 @@
             <a:effectLst/>
             <a:extLst>
               <a:ext uri="{C572A759-6A51-4108-AA02-DFA0A04FC94B}">
-                <ma14:wrappingTextBoxFlag xmlns="" xmlns:m="http://schemas.openxmlformats.org/officeDocument/2006/math" xmlns:a14="http://schemas.microsoft.com/office/drawing/2010/main" xmlns:ma14="http://schemas.microsoft.com/office/mac/drawingml/2011/main" val="1"/>
+                <ma14:wrappingTextBoxFlag xmlns:ma14="http://schemas.microsoft.com/office/mac/drawingml/2011/main" xmlns:a14="http://schemas.microsoft.com/office/drawing/2010/main" xmlns:m="http://schemas.openxmlformats.org/officeDocument/2006/math" xmlns="" val="1"/>
               </a:ext>
             </a:extLst>
           </p:spPr>
@@ -7182,16 +7182,33 @@
             <a:p>
               <a:r>
                 <a:rPr dirty="0"/>
-                <a:t>Modo </a:t>
+                <a:t>“strict mode”</a:t>
               </a:r>
               <a:r>
-                <a:rPr dirty="0" err="1"/>
-                <a:t>estricto</a:t>
+                <a:rPr lang="es-ES" dirty="0"/>
+                <a:t>, </a:t>
               </a:r>
               <a:r>
-                <a:rPr dirty="0"/>
-                <a:t>, “strict mode”</a:t>
+                <a:rPr lang="es-ES" dirty="0" err="1"/>
+                <a:t>map</a:t>
               </a:r>
+              <a:r>
+                <a:rPr lang="es-ES" dirty="0"/>
+                <a:t>, </a:t>
+              </a:r>
+              <a:r>
+                <a:rPr lang="es-ES" dirty="0" err="1"/>
+                <a:t>filter</a:t>
+              </a:r>
+              <a:r>
+                <a:rPr lang="es-ES" dirty="0"/>
+                <a:t>, reduce, </a:t>
+              </a:r>
+              <a:r>
+                <a:rPr lang="es-ES" dirty="0" err="1"/>
+                <a:t>etc</a:t>
+              </a:r>
+              <a:endParaRPr dirty="0"/>
             </a:p>
           </p:txBody>
         </p:sp>
@@ -7217,7 +7234,7 @@
             <a:effectLst/>
             <a:extLst>
               <a:ext uri="{C572A759-6A51-4108-AA02-DFA0A04FC94B}">
-                <ma14:wrappingTextBoxFlag xmlns="" xmlns:m="http://schemas.openxmlformats.org/officeDocument/2006/math" xmlns:a14="http://schemas.microsoft.com/office/drawing/2010/main" xmlns:ma14="http://schemas.microsoft.com/office/mac/drawingml/2011/main" val="1"/>
+                <ma14:wrappingTextBoxFlag xmlns:ma14="http://schemas.microsoft.com/office/mac/drawingml/2011/main" xmlns:a14="http://schemas.microsoft.com/office/drawing/2010/main" xmlns:m="http://schemas.openxmlformats.org/officeDocument/2006/math" xmlns="" val="1"/>
               </a:ext>
             </a:extLst>
           </p:spPr>
@@ -7339,7 +7356,7 @@
             <a:effectLst/>
             <a:extLst>
               <a:ext uri="{C572A759-6A51-4108-AA02-DFA0A04FC94B}">
-                <ma14:wrappingTextBoxFlag xmlns="" xmlns:m="http://schemas.openxmlformats.org/officeDocument/2006/math" xmlns:a14="http://schemas.microsoft.com/office/drawing/2010/main" xmlns:ma14="http://schemas.microsoft.com/office/mac/drawingml/2011/main" val="1"/>
+                <ma14:wrappingTextBoxFlag xmlns:ma14="http://schemas.microsoft.com/office/mac/drawingml/2011/main" xmlns:a14="http://schemas.microsoft.com/office/drawing/2010/main" xmlns:m="http://schemas.openxmlformats.org/officeDocument/2006/math" xmlns="" val="1"/>
               </a:ext>
             </a:extLst>
           </p:spPr>
@@ -7395,7 +7412,7 @@
             <a:effectLst/>
             <a:extLst>
               <a:ext uri="{C572A759-6A51-4108-AA02-DFA0A04FC94B}">
-                <ma14:wrappingTextBoxFlag xmlns="" xmlns:m="http://schemas.openxmlformats.org/officeDocument/2006/math" xmlns:a14="http://schemas.microsoft.com/office/drawing/2010/main" xmlns:ma14="http://schemas.microsoft.com/office/mac/drawingml/2011/main" val="1"/>
+                <ma14:wrappingTextBoxFlag xmlns:ma14="http://schemas.microsoft.com/office/mac/drawingml/2011/main" xmlns:a14="http://schemas.microsoft.com/office/drawing/2010/main" xmlns:m="http://schemas.openxmlformats.org/officeDocument/2006/math" xmlns="" val="1"/>
               </a:ext>
             </a:extLst>
           </p:spPr>
@@ -7517,7 +7534,7 @@
             <a:effectLst/>
             <a:extLst>
               <a:ext uri="{C572A759-6A51-4108-AA02-DFA0A04FC94B}">
-                <ma14:wrappingTextBoxFlag xmlns="" xmlns:m="http://schemas.openxmlformats.org/officeDocument/2006/math" xmlns:a14="http://schemas.microsoft.com/office/drawing/2010/main" xmlns:ma14="http://schemas.microsoft.com/office/mac/drawingml/2011/main" val="1"/>
+                <ma14:wrappingTextBoxFlag xmlns:ma14="http://schemas.microsoft.com/office/mac/drawingml/2011/main" xmlns:a14="http://schemas.microsoft.com/office/drawing/2010/main" xmlns:m="http://schemas.openxmlformats.org/officeDocument/2006/math" xmlns="" val="1"/>
               </a:ext>
             </a:extLst>
           </p:spPr>
@@ -7568,7 +7585,7 @@
             <a:effectLst/>
             <a:extLst>
               <a:ext uri="{C572A759-6A51-4108-AA02-DFA0A04FC94B}">
-                <ma14:wrappingTextBoxFlag xmlns="" xmlns:m="http://schemas.openxmlformats.org/officeDocument/2006/math" xmlns:a14="http://schemas.microsoft.com/office/drawing/2010/main" xmlns:ma14="http://schemas.microsoft.com/office/mac/drawingml/2011/main" val="1"/>
+                <ma14:wrappingTextBoxFlag xmlns:ma14="http://schemas.microsoft.com/office/mac/drawingml/2011/main" xmlns:a14="http://schemas.microsoft.com/office/drawing/2010/main" xmlns:m="http://schemas.openxmlformats.org/officeDocument/2006/math" xmlns="" val="1"/>
               </a:ext>
             </a:extLst>
           </p:spPr>
@@ -7694,7 +7711,7 @@
             <a:effectLst/>
             <a:extLst>
               <a:ext uri="{C572A759-6A51-4108-AA02-DFA0A04FC94B}">
-                <ma14:wrappingTextBoxFlag xmlns="" xmlns:m="http://schemas.openxmlformats.org/officeDocument/2006/math" xmlns:a14="http://schemas.microsoft.com/office/drawing/2010/main" xmlns:ma14="http://schemas.microsoft.com/office/mac/drawingml/2011/main" val="1"/>
+                <ma14:wrappingTextBoxFlag xmlns:ma14="http://schemas.microsoft.com/office/mac/drawingml/2011/main" xmlns:a14="http://schemas.microsoft.com/office/drawing/2010/main" xmlns:m="http://schemas.openxmlformats.org/officeDocument/2006/math" xmlns="" val="1"/>
               </a:ext>
             </a:extLst>
           </p:spPr>
@@ -7750,7 +7767,7 @@
             <a:effectLst/>
             <a:extLst>
               <a:ext uri="{C572A759-6A51-4108-AA02-DFA0A04FC94B}">
-                <ma14:wrappingTextBoxFlag xmlns="" xmlns:m="http://schemas.openxmlformats.org/officeDocument/2006/math" xmlns:a14="http://schemas.microsoft.com/office/drawing/2010/main" xmlns:ma14="http://schemas.microsoft.com/office/mac/drawingml/2011/main" val="1"/>
+                <ma14:wrappingTextBoxFlag xmlns:ma14="http://schemas.microsoft.com/office/mac/drawingml/2011/main" xmlns:a14="http://schemas.microsoft.com/office/drawing/2010/main" xmlns:m="http://schemas.openxmlformats.org/officeDocument/2006/math" xmlns="" val="1"/>
               </a:ext>
             </a:extLst>
           </p:spPr>
@@ -7872,7 +7889,7 @@
             <a:effectLst/>
             <a:extLst>
               <a:ext uri="{C572A759-6A51-4108-AA02-DFA0A04FC94B}">
-                <ma14:wrappingTextBoxFlag xmlns="" xmlns:m="http://schemas.openxmlformats.org/officeDocument/2006/math" xmlns:a14="http://schemas.microsoft.com/office/drawing/2010/main" xmlns:ma14="http://schemas.microsoft.com/office/mac/drawingml/2011/main" val="1"/>
+                <ma14:wrappingTextBoxFlag xmlns:ma14="http://schemas.microsoft.com/office/mac/drawingml/2011/main" xmlns:a14="http://schemas.microsoft.com/office/drawing/2010/main" xmlns:m="http://schemas.openxmlformats.org/officeDocument/2006/math" xmlns="" val="1"/>
               </a:ext>
             </a:extLst>
           </p:spPr>
@@ -7995,7 +8012,7 @@
               <a:effectLst/>
               <a:extLst>
                 <a:ext uri="{C572A759-6A51-4108-AA02-DFA0A04FC94B}">
-                  <ma14:wrappingTextBoxFlag xmlns="" xmlns:m="http://schemas.openxmlformats.org/officeDocument/2006/math" xmlns:a14="http://schemas.microsoft.com/office/drawing/2010/main" xmlns:ma14="http://schemas.microsoft.com/office/mac/drawingml/2011/main" val="1"/>
+                  <ma14:wrappingTextBoxFlag xmlns:ma14="http://schemas.microsoft.com/office/mac/drawingml/2011/main" xmlns:a14="http://schemas.microsoft.com/office/drawing/2010/main" xmlns:m="http://schemas.openxmlformats.org/officeDocument/2006/math" xmlns="" val="1"/>
                 </a:ext>
               </a:extLst>
             </p:spPr>
@@ -8107,7 +8124,7 @@
               <a:effectLst/>
               <a:extLst>
                 <a:ext uri="{C572A759-6A51-4108-AA02-DFA0A04FC94B}">
-                  <ma14:wrappingTextBoxFlag xmlns="" xmlns:m="http://schemas.openxmlformats.org/officeDocument/2006/math" xmlns:a14="http://schemas.microsoft.com/office/drawing/2010/main" xmlns:ma14="http://schemas.microsoft.com/office/mac/drawingml/2011/main" val="1"/>
+                  <ma14:wrappingTextBoxFlag xmlns:ma14="http://schemas.microsoft.com/office/mac/drawingml/2011/main" xmlns:a14="http://schemas.microsoft.com/office/drawing/2010/main" xmlns:m="http://schemas.openxmlformats.org/officeDocument/2006/math" xmlns="" val="1"/>
                 </a:ext>
               </a:extLst>
             </p:spPr>
@@ -8158,7 +8175,7 @@
             <a:effectLst/>
             <a:extLst>
               <a:ext uri="{C572A759-6A51-4108-AA02-DFA0A04FC94B}">
-                <ma14:wrappingTextBoxFlag xmlns="" xmlns:m="http://schemas.openxmlformats.org/officeDocument/2006/math" xmlns:a14="http://schemas.microsoft.com/office/drawing/2010/main" xmlns:ma14="http://schemas.microsoft.com/office/mac/drawingml/2011/main" val="1"/>
+                <ma14:wrappingTextBoxFlag xmlns:ma14="http://schemas.microsoft.com/office/mac/drawingml/2011/main" xmlns:a14="http://schemas.microsoft.com/office/drawing/2010/main" xmlns:m="http://schemas.openxmlformats.org/officeDocument/2006/math" xmlns="" val="1"/>
               </a:ext>
             </a:extLst>
           </p:spPr>
@@ -8280,7 +8297,7 @@
             <a:effectLst/>
             <a:extLst>
               <a:ext uri="{C572A759-6A51-4108-AA02-DFA0A04FC94B}">
-                <ma14:wrappingTextBoxFlag xmlns="" xmlns:m="http://schemas.openxmlformats.org/officeDocument/2006/math" xmlns:a14="http://schemas.microsoft.com/office/drawing/2010/main" xmlns:ma14="http://schemas.microsoft.com/office/mac/drawingml/2011/main" val="1"/>
+                <ma14:wrappingTextBoxFlag xmlns:ma14="http://schemas.microsoft.com/office/mac/drawingml/2011/main" xmlns:a14="http://schemas.microsoft.com/office/drawing/2010/main" xmlns:m="http://schemas.openxmlformats.org/officeDocument/2006/math" xmlns="" val="1"/>
               </a:ext>
             </a:extLst>
           </p:spPr>
@@ -8391,7 +8408,7 @@
               <a:effectLst/>
               <a:extLst>
                 <a:ext uri="{C572A759-6A51-4108-AA02-DFA0A04FC94B}">
-                  <ma14:wrappingTextBoxFlag xmlns="" xmlns:m="http://schemas.openxmlformats.org/officeDocument/2006/math" xmlns:a14="http://schemas.microsoft.com/office/drawing/2010/main" xmlns:ma14="http://schemas.microsoft.com/office/mac/drawingml/2011/main" val="1"/>
+                  <ma14:wrappingTextBoxFlag xmlns:ma14="http://schemas.microsoft.com/office/mac/drawingml/2011/main" xmlns:a14="http://schemas.microsoft.com/office/drawing/2010/main" xmlns:m="http://schemas.openxmlformats.org/officeDocument/2006/math" xmlns="" val="1"/>
                 </a:ext>
               </a:extLst>
             </p:spPr>
@@ -8502,7 +8519,7 @@
               <a:effectLst/>
               <a:extLst>
                 <a:ext uri="{C572A759-6A51-4108-AA02-DFA0A04FC94B}">
-                  <ma14:wrappingTextBoxFlag xmlns="" xmlns:m="http://schemas.openxmlformats.org/officeDocument/2006/math" xmlns:a14="http://schemas.microsoft.com/office/drawing/2010/main" xmlns:ma14="http://schemas.microsoft.com/office/mac/drawingml/2011/main" val="1"/>
+                  <ma14:wrappingTextBoxFlag xmlns:ma14="http://schemas.microsoft.com/office/mac/drawingml/2011/main" xmlns:a14="http://schemas.microsoft.com/office/drawing/2010/main" xmlns:m="http://schemas.openxmlformats.org/officeDocument/2006/math" xmlns="" val="1"/>
                 </a:ext>
               </a:extLst>
             </p:spPr>
@@ -8553,7 +8570,7 @@
             <a:effectLst/>
             <a:extLst>
               <a:ext uri="{C572A759-6A51-4108-AA02-DFA0A04FC94B}">
-                <ma14:wrappingTextBoxFlag xmlns="" xmlns:m="http://schemas.openxmlformats.org/officeDocument/2006/math" xmlns:a14="http://schemas.microsoft.com/office/drawing/2010/main" xmlns:ma14="http://schemas.microsoft.com/office/mac/drawingml/2011/main" val="1"/>
+                <ma14:wrappingTextBoxFlag xmlns:ma14="http://schemas.microsoft.com/office/mac/drawingml/2011/main" xmlns:a14="http://schemas.microsoft.com/office/drawing/2010/main" xmlns:m="http://schemas.openxmlformats.org/officeDocument/2006/math" xmlns="" val="1"/>
               </a:ext>
             </a:extLst>
           </p:spPr>
@@ -8675,7 +8692,7 @@
             <a:effectLst/>
             <a:extLst>
               <a:ext uri="{C572A759-6A51-4108-AA02-DFA0A04FC94B}">
-                <ma14:wrappingTextBoxFlag xmlns="" xmlns:m="http://schemas.openxmlformats.org/officeDocument/2006/math" xmlns:a14="http://schemas.microsoft.com/office/drawing/2010/main" xmlns:ma14="http://schemas.microsoft.com/office/mac/drawingml/2011/main" val="1"/>
+                <ma14:wrappingTextBoxFlag xmlns:ma14="http://schemas.microsoft.com/office/mac/drawingml/2011/main" xmlns:a14="http://schemas.microsoft.com/office/drawing/2010/main" xmlns:m="http://schemas.openxmlformats.org/officeDocument/2006/math" xmlns="" val="1"/>
               </a:ext>
             </a:extLst>
           </p:spPr>
@@ -8799,7 +8816,7 @@
               <a:effectLst/>
               <a:extLst>
                 <a:ext uri="{C572A759-6A51-4108-AA02-DFA0A04FC94B}">
-                  <ma14:wrappingTextBoxFlag xmlns="" xmlns:m="http://schemas.openxmlformats.org/officeDocument/2006/math" xmlns:a14="http://schemas.microsoft.com/office/drawing/2010/main" xmlns:ma14="http://schemas.microsoft.com/office/mac/drawingml/2011/main" val="1"/>
+                  <ma14:wrappingTextBoxFlag xmlns:ma14="http://schemas.microsoft.com/office/mac/drawingml/2011/main" xmlns:a14="http://schemas.microsoft.com/office/drawing/2010/main" xmlns:m="http://schemas.openxmlformats.org/officeDocument/2006/math" xmlns="" val="1"/>
                 </a:ext>
               </a:extLst>
             </p:spPr>
@@ -8910,7 +8927,7 @@
               <a:effectLst/>
               <a:extLst>
                 <a:ext uri="{C572A759-6A51-4108-AA02-DFA0A04FC94B}">
-                  <ma14:wrappingTextBoxFlag xmlns="" xmlns:m="http://schemas.openxmlformats.org/officeDocument/2006/math" xmlns:a14="http://schemas.microsoft.com/office/drawing/2010/main" xmlns:ma14="http://schemas.microsoft.com/office/mac/drawingml/2011/main" val="1"/>
+                  <ma14:wrappingTextBoxFlag xmlns:ma14="http://schemas.microsoft.com/office/mac/drawingml/2011/main" xmlns:a14="http://schemas.microsoft.com/office/drawing/2010/main" xmlns:m="http://schemas.openxmlformats.org/officeDocument/2006/math" xmlns="" val="1"/>
                 </a:ext>
               </a:extLst>
             </p:spPr>
@@ -8961,7 +8978,7 @@
             <a:effectLst/>
             <a:extLst>
               <a:ext uri="{C572A759-6A51-4108-AA02-DFA0A04FC94B}">
-                <ma14:wrappingTextBoxFlag xmlns="" xmlns:m="http://schemas.openxmlformats.org/officeDocument/2006/math" xmlns:a14="http://schemas.microsoft.com/office/drawing/2010/main" xmlns:ma14="http://schemas.microsoft.com/office/mac/drawingml/2011/main" val="1"/>
+                <ma14:wrappingTextBoxFlag xmlns:ma14="http://schemas.microsoft.com/office/mac/drawingml/2011/main" xmlns:a14="http://schemas.microsoft.com/office/drawing/2010/main" xmlns:m="http://schemas.openxmlformats.org/officeDocument/2006/math" xmlns="" val="1"/>
               </a:ext>
             </a:extLst>
           </p:spPr>
@@ -9014,7 +9031,7 @@
           </a:ln>
           <a:extLst>
             <a:ext uri="{C572A759-6A51-4108-AA02-DFA0A04FC94B}">
-              <ma14:wrappingTextBoxFlag xmlns="" xmlns:m="http://schemas.openxmlformats.org/officeDocument/2006/math" xmlns:a14="http://schemas.microsoft.com/office/drawing/2010/main" xmlns:ma14="http://schemas.microsoft.com/office/mac/drawingml/2011/main" val="1"/>
+              <ma14:wrappingTextBoxFlag xmlns:ma14="http://schemas.microsoft.com/office/mac/drawingml/2011/main" xmlns:a14="http://schemas.microsoft.com/office/drawing/2010/main" xmlns:m="http://schemas.openxmlformats.org/officeDocument/2006/math" xmlns="" val="1"/>
             </a:ext>
           </a:extLst>
         </p:spPr>
@@ -9171,7 +9188,7 @@
           </a:ln>
           <a:extLst>
             <a:ext uri="{C572A759-6A51-4108-AA02-DFA0A04FC94B}">
-              <ma14:wrappingTextBoxFlag xmlns="" xmlns:m="http://schemas.openxmlformats.org/officeDocument/2006/math" xmlns:a14="http://schemas.microsoft.com/office/drawing/2010/main" xmlns:ma14="http://schemas.microsoft.com/office/mac/drawingml/2011/main" val="1"/>
+              <ma14:wrappingTextBoxFlag xmlns:ma14="http://schemas.microsoft.com/office/mac/drawingml/2011/main" xmlns:a14="http://schemas.microsoft.com/office/drawing/2010/main" xmlns:m="http://schemas.openxmlformats.org/officeDocument/2006/math" xmlns="" val="1"/>
             </a:ext>
           </a:extLst>
         </p:spPr>
@@ -9243,7 +9260,7 @@
           </a:ln>
           <a:extLst>
             <a:ext uri="{C572A759-6A51-4108-AA02-DFA0A04FC94B}">
-              <ma14:wrappingTextBoxFlag xmlns="" xmlns:m="http://schemas.openxmlformats.org/officeDocument/2006/math" xmlns:a14="http://schemas.microsoft.com/office/drawing/2010/main" xmlns:ma14="http://schemas.microsoft.com/office/mac/drawingml/2011/main" val="1"/>
+              <ma14:wrappingTextBoxFlag xmlns:ma14="http://schemas.microsoft.com/office/mac/drawingml/2011/main" xmlns:a14="http://schemas.microsoft.com/office/drawing/2010/main" xmlns:m="http://schemas.openxmlformats.org/officeDocument/2006/math" xmlns="" val="1"/>
             </a:ext>
           </a:extLst>
         </p:spPr>
@@ -9315,7 +9332,7 @@
           </a:ln>
           <a:extLst>
             <a:ext uri="{C572A759-6A51-4108-AA02-DFA0A04FC94B}">
-              <ma14:wrappingTextBoxFlag xmlns="" xmlns:m="http://schemas.openxmlformats.org/officeDocument/2006/math" xmlns:a14="http://schemas.microsoft.com/office/drawing/2010/main" xmlns:ma14="http://schemas.microsoft.com/office/mac/drawingml/2011/main" val="1"/>
+              <ma14:wrappingTextBoxFlag xmlns:ma14="http://schemas.microsoft.com/office/mac/drawingml/2011/main" xmlns:a14="http://schemas.microsoft.com/office/drawing/2010/main" xmlns:m="http://schemas.openxmlformats.org/officeDocument/2006/math" xmlns="" val="1"/>
             </a:ext>
           </a:extLst>
         </p:spPr>
@@ -9500,7 +9517,7 @@
           </a:ln>
           <a:extLst>
             <a:ext uri="{C572A759-6A51-4108-AA02-DFA0A04FC94B}">
-              <ma14:wrappingTextBoxFlag xmlns="" xmlns:m="http://schemas.openxmlformats.org/officeDocument/2006/math" xmlns:a14="http://schemas.microsoft.com/office/drawing/2010/main" xmlns:ma14="http://schemas.microsoft.com/office/mac/drawingml/2011/main" val="1"/>
+              <ma14:wrappingTextBoxFlag xmlns:ma14="http://schemas.microsoft.com/office/mac/drawingml/2011/main" xmlns:a14="http://schemas.microsoft.com/office/drawing/2010/main" xmlns:m="http://schemas.openxmlformats.org/officeDocument/2006/math" xmlns="" val="1"/>
             </a:ext>
           </a:extLst>
         </p:spPr>
@@ -9590,7 +9607,7 @@
           </a:ln>
           <a:extLst>
             <a:ext uri="{C572A759-6A51-4108-AA02-DFA0A04FC94B}">
-              <ma14:wrappingTextBoxFlag xmlns="" xmlns:m="http://schemas.openxmlformats.org/officeDocument/2006/math" xmlns:a14="http://schemas.microsoft.com/office/drawing/2010/main" xmlns:ma14="http://schemas.microsoft.com/office/mac/drawingml/2011/main" val="1"/>
+              <ma14:wrappingTextBoxFlag xmlns:ma14="http://schemas.microsoft.com/office/mac/drawingml/2011/main" xmlns:a14="http://schemas.microsoft.com/office/drawing/2010/main" xmlns:m="http://schemas.openxmlformats.org/officeDocument/2006/math" xmlns="" val="1"/>
             </a:ext>
           </a:extLst>
         </p:spPr>
@@ -9639,7 +9656,7 @@
           </a:ln>
           <a:extLst>
             <a:ext uri="{C572A759-6A51-4108-AA02-DFA0A04FC94B}">
-              <ma14:wrappingTextBoxFlag xmlns="" xmlns:m="http://schemas.openxmlformats.org/officeDocument/2006/math" xmlns:a14="http://schemas.microsoft.com/office/drawing/2010/main" xmlns:ma14="http://schemas.microsoft.com/office/mac/drawingml/2011/main" val="1"/>
+              <ma14:wrappingTextBoxFlag xmlns:ma14="http://schemas.microsoft.com/office/mac/drawingml/2011/main" xmlns:a14="http://schemas.microsoft.com/office/drawing/2010/main" xmlns:m="http://schemas.openxmlformats.org/officeDocument/2006/math" xmlns="" val="1"/>
             </a:ext>
           </a:extLst>
         </p:spPr>
@@ -9688,7 +9705,7 @@
           </a:ln>
           <a:extLst>
             <a:ext uri="{C572A759-6A51-4108-AA02-DFA0A04FC94B}">
-              <ma14:wrappingTextBoxFlag xmlns="" xmlns:m="http://schemas.openxmlformats.org/officeDocument/2006/math" xmlns:a14="http://schemas.microsoft.com/office/drawing/2010/main" xmlns:ma14="http://schemas.microsoft.com/office/mac/drawingml/2011/main" val="1"/>
+              <ma14:wrappingTextBoxFlag xmlns:ma14="http://schemas.microsoft.com/office/mac/drawingml/2011/main" xmlns:a14="http://schemas.microsoft.com/office/drawing/2010/main" xmlns:m="http://schemas.openxmlformats.org/officeDocument/2006/math" xmlns="" val="1"/>
             </a:ext>
           </a:extLst>
         </p:spPr>
@@ -9743,7 +9760,7 @@
           </a:ln>
           <a:extLst>
             <a:ext uri="{C572A759-6A51-4108-AA02-DFA0A04FC94B}">
-              <ma14:wrappingTextBoxFlag xmlns="" xmlns:m="http://schemas.openxmlformats.org/officeDocument/2006/math" xmlns:a14="http://schemas.microsoft.com/office/drawing/2010/main" xmlns:ma14="http://schemas.microsoft.com/office/mac/drawingml/2011/main" val="1"/>
+              <ma14:wrappingTextBoxFlag xmlns:ma14="http://schemas.microsoft.com/office/mac/drawingml/2011/main" xmlns:a14="http://schemas.microsoft.com/office/drawing/2010/main" xmlns:m="http://schemas.openxmlformats.org/officeDocument/2006/math" xmlns="" val="1"/>
             </a:ext>
           </a:extLst>
         </p:spPr>
@@ -9895,9 +9912,9 @@
         <p:grpSpPr>
           <a:xfrm>
             <a:off x="4619194" y="2839470"/>
-            <a:ext cx="3128888" cy="280048"/>
+            <a:ext cx="2753393" cy="280048"/>
             <a:chOff x="137" y="0"/>
-            <a:chExt cx="3128887" cy="280047"/>
+            <a:chExt cx="2753392" cy="280047"/>
           </a:xfrm>
         </p:grpSpPr>
         <p:sp>
@@ -9971,7 +9988,7 @@
           <p:spPr>
             <a:xfrm>
               <a:off x="803175" y="3051"/>
-              <a:ext cx="2325849" cy="276996"/>
+              <a:ext cx="1950354" cy="276996"/>
             </a:xfrm>
             <a:prstGeom prst="rect">
               <a:avLst/>
@@ -9986,7 +10003,7 @@
             <a:effectLst/>
             <a:extLst>
               <a:ext uri="{C572A759-6A51-4108-AA02-DFA0A04FC94B}">
-                <ma14:wrappingTextBoxFlag xmlns="" xmlns:m="http://schemas.openxmlformats.org/officeDocument/2006/math" xmlns:a14="http://schemas.microsoft.com/office/drawing/2010/main" xmlns:ma14="http://schemas.microsoft.com/office/mac/drawingml/2011/main" val="1"/>
+                <ma14:wrappingTextBoxFlag xmlns:ma14="http://schemas.microsoft.com/office/mac/drawingml/2011/main" xmlns:a14="http://schemas.microsoft.com/office/drawing/2010/main" xmlns:m="http://schemas.openxmlformats.org/officeDocument/2006/math" xmlns="" val="1"/>
               </a:ext>
             </a:extLst>
           </p:spPr>
@@ -10009,32 +10026,12 @@
             </a:lstStyle>
             <a:p>
               <a:r>
-                <a:rPr lang="es-ES" dirty="0" err="1"/>
-                <a:t>Map</a:t>
-              </a:r>
-              <a:r>
                 <a:rPr lang="es-ES" dirty="0"/>
-                <a:t>, </a:t>
+                <a:t>Mantenimiento, </a:t>
               </a:r>
               <a:r>
                 <a:rPr lang="es-ES" dirty="0" err="1"/>
-                <a:t>filter</a:t>
-              </a:r>
-              <a:r>
-                <a:rPr lang="es-ES" dirty="0"/>
-                <a:t>, reduce, </a:t>
-              </a:r>
-              <a:r>
-                <a:rPr lang="es-ES" dirty="0" err="1"/>
-                <a:t>forEach</a:t>
-              </a:r>
-              <a:r>
-                <a:rPr lang="es-ES" dirty="0"/>
-                <a:t>, </a:t>
-              </a:r>
-              <a:r>
-                <a:rPr lang="es-ES" dirty="0" err="1"/>
-                <a:t>etc</a:t>
+                <a:t>bugfixing</a:t>
               </a:r>
               <a:endParaRPr dirty="0"/>
             </a:p>
@@ -10068,7 +10065,7 @@
             <a:effectLst/>
             <a:extLst>
               <a:ext uri="{C572A759-6A51-4108-AA02-DFA0A04FC94B}">
-                <ma14:wrappingTextBoxFlag xmlns="" xmlns:m="http://schemas.openxmlformats.org/officeDocument/2006/math" xmlns:a14="http://schemas.microsoft.com/office/drawing/2010/main" xmlns:ma14="http://schemas.microsoft.com/office/mac/drawingml/2011/main" val="1"/>
+                <ma14:wrappingTextBoxFlag xmlns:ma14="http://schemas.microsoft.com/office/mac/drawingml/2011/main" xmlns:a14="http://schemas.microsoft.com/office/drawing/2010/main" xmlns:m="http://schemas.openxmlformats.org/officeDocument/2006/math" xmlns="" val="1"/>
               </a:ext>
             </a:extLst>
           </p:spPr>
@@ -10552,7 +10549,7 @@
           <a:effectLst/>
           <a:extLst>
             <a:ext uri="{C572A759-6A51-4108-AA02-DFA0A04FC94B}">
-              <ma14:wrappingTextBoxFlag xmlns="" xmlns:m="http://schemas.openxmlformats.org/officeDocument/2006/math" xmlns:a14="http://schemas.microsoft.com/office/drawing/2010/main" xmlns:ma14="http://schemas.microsoft.com/office/mac/drawingml/2011/main" val="1"/>
+              <ma14:wrappingTextBoxFlag xmlns:ma14="http://schemas.microsoft.com/office/mac/drawingml/2011/main" xmlns:a14="http://schemas.microsoft.com/office/drawing/2010/main" xmlns:m="http://schemas.openxmlformats.org/officeDocument/2006/math" xmlns="" val="1"/>
             </a:ext>
           </a:extLst>
         </p:spPr>
@@ -10601,7 +10598,7 @@
           </a:ln>
           <a:extLst>
             <a:ext uri="{C572A759-6A51-4108-AA02-DFA0A04FC94B}">
-              <ma14:wrappingTextBoxFlag xmlns="" xmlns:m="http://schemas.openxmlformats.org/officeDocument/2006/math" xmlns:a14="http://schemas.microsoft.com/office/drawing/2010/main" xmlns:ma14="http://schemas.microsoft.com/office/mac/drawingml/2011/main" val="1"/>
+              <ma14:wrappingTextBoxFlag xmlns:ma14="http://schemas.microsoft.com/office/mac/drawingml/2011/main" xmlns:a14="http://schemas.microsoft.com/office/drawing/2010/main" xmlns:m="http://schemas.openxmlformats.org/officeDocument/2006/math" xmlns="" val="1"/>
             </a:ext>
           </a:extLst>
         </p:spPr>
@@ -10674,7 +10671,7 @@
           <a:effectLst/>
           <a:extLst>
             <a:ext uri="{C572A759-6A51-4108-AA02-DFA0A04FC94B}">
-              <ma14:wrappingTextBoxFlag xmlns="" xmlns:m="http://schemas.openxmlformats.org/officeDocument/2006/math" xmlns:a14="http://schemas.microsoft.com/office/drawing/2010/main" xmlns:ma14="http://schemas.microsoft.com/office/mac/drawingml/2011/main" val="1"/>
+              <ma14:wrappingTextBoxFlag xmlns:ma14="http://schemas.microsoft.com/office/mac/drawingml/2011/main" xmlns:a14="http://schemas.microsoft.com/office/drawing/2010/main" xmlns:m="http://schemas.openxmlformats.org/officeDocument/2006/math" xmlns="" val="1"/>
             </a:ext>
           </a:extLst>
         </p:spPr>
@@ -11008,7 +11005,7 @@
           </a:ln>
           <a:extLst>
             <a:ext uri="{C572A759-6A51-4108-AA02-DFA0A04FC94B}">
-              <ma14:wrappingTextBoxFlag xmlns="" xmlns:m="http://schemas.openxmlformats.org/officeDocument/2006/math" xmlns:a14="http://schemas.microsoft.com/office/drawing/2010/main" xmlns:ma14="http://schemas.microsoft.com/office/mac/drawingml/2011/main" val="1"/>
+              <ma14:wrappingTextBoxFlag xmlns:ma14="http://schemas.microsoft.com/office/mac/drawingml/2011/main" xmlns:a14="http://schemas.microsoft.com/office/drawing/2010/main" xmlns:m="http://schemas.openxmlformats.org/officeDocument/2006/math" xmlns="" val="1"/>
             </a:ext>
           </a:extLst>
         </p:spPr>
@@ -11305,7 +11302,7 @@
           </a:ln>
           <a:extLst>
             <a:ext uri="{C572A759-6A51-4108-AA02-DFA0A04FC94B}">
-              <ma14:wrappingTextBoxFlag xmlns="" xmlns:m="http://schemas.openxmlformats.org/officeDocument/2006/math" xmlns:a14="http://schemas.microsoft.com/office/drawing/2010/main" xmlns:ma14="http://schemas.microsoft.com/office/mac/drawingml/2011/main" val="1"/>
+              <ma14:wrappingTextBoxFlag xmlns:ma14="http://schemas.microsoft.com/office/mac/drawingml/2011/main" xmlns:a14="http://schemas.microsoft.com/office/drawing/2010/main" xmlns:m="http://schemas.openxmlformats.org/officeDocument/2006/math" xmlns="" val="1"/>
             </a:ext>
           </a:extLst>
         </p:spPr>
@@ -11839,7 +11836,7 @@
           </a:ln>
           <a:extLst>
             <a:ext uri="{C572A759-6A51-4108-AA02-DFA0A04FC94B}">
-              <ma14:wrappingTextBoxFlag xmlns="" xmlns:m="http://schemas.openxmlformats.org/officeDocument/2006/math" xmlns:a14="http://schemas.microsoft.com/office/drawing/2010/main" xmlns:ma14="http://schemas.microsoft.com/office/mac/drawingml/2011/main" val="1"/>
+              <ma14:wrappingTextBoxFlag xmlns:ma14="http://schemas.microsoft.com/office/mac/drawingml/2011/main" xmlns:a14="http://schemas.microsoft.com/office/drawing/2010/main" xmlns:m="http://schemas.openxmlformats.org/officeDocument/2006/math" xmlns="" val="1"/>
             </a:ext>
           </a:extLst>
         </p:spPr>
@@ -12112,7 +12109,7 @@
             <a:effectLst/>
             <a:extLst>
               <a:ext uri="{C572A759-6A51-4108-AA02-DFA0A04FC94B}">
-                <ma14:wrappingTextBoxFlag xmlns="" xmlns:m="http://schemas.openxmlformats.org/officeDocument/2006/math" xmlns:a14="http://schemas.microsoft.com/office/drawing/2010/main" xmlns:ma14="http://schemas.microsoft.com/office/mac/drawingml/2011/main" val="1"/>
+                <ma14:wrappingTextBoxFlag xmlns:ma14="http://schemas.microsoft.com/office/mac/drawingml/2011/main" xmlns:a14="http://schemas.microsoft.com/office/drawing/2010/main" xmlns:m="http://schemas.openxmlformats.org/officeDocument/2006/math" xmlns="" val="1"/>
               </a:ext>
             </a:extLst>
           </p:spPr>
@@ -12162,7 +12159,7 @@
             <a:effectLst/>
             <a:extLst>
               <a:ext uri="{C572A759-6A51-4108-AA02-DFA0A04FC94B}">
-                <ma14:wrappingTextBoxFlag xmlns="" xmlns:m="http://schemas.openxmlformats.org/officeDocument/2006/math" xmlns:a14="http://schemas.microsoft.com/office/drawing/2010/main" xmlns:ma14="http://schemas.microsoft.com/office/mac/drawingml/2011/main" val="1"/>
+                <ma14:wrappingTextBoxFlag xmlns:ma14="http://schemas.microsoft.com/office/mac/drawingml/2011/main" xmlns:a14="http://schemas.microsoft.com/office/drawing/2010/main" xmlns:m="http://schemas.openxmlformats.org/officeDocument/2006/math" xmlns="" val="1"/>
               </a:ext>
             </a:extLst>
           </p:spPr>
@@ -12212,7 +12209,7 @@
             <a:effectLst/>
             <a:extLst>
               <a:ext uri="{C572A759-6A51-4108-AA02-DFA0A04FC94B}">
-                <ma14:wrappingTextBoxFlag xmlns="" xmlns:m="http://schemas.openxmlformats.org/officeDocument/2006/math" xmlns:a14="http://schemas.microsoft.com/office/drawing/2010/main" xmlns:ma14="http://schemas.microsoft.com/office/mac/drawingml/2011/main" val="1"/>
+                <ma14:wrappingTextBoxFlag xmlns:ma14="http://schemas.microsoft.com/office/mac/drawingml/2011/main" xmlns:a14="http://schemas.microsoft.com/office/drawing/2010/main" xmlns:m="http://schemas.openxmlformats.org/officeDocument/2006/math" xmlns="" val="1"/>
               </a:ext>
             </a:extLst>
           </p:spPr>
@@ -12262,7 +12259,7 @@
             <a:effectLst/>
             <a:extLst>
               <a:ext uri="{C572A759-6A51-4108-AA02-DFA0A04FC94B}">
-                <ma14:wrappingTextBoxFlag xmlns="" xmlns:m="http://schemas.openxmlformats.org/officeDocument/2006/math" xmlns:a14="http://schemas.microsoft.com/office/drawing/2010/main" xmlns:ma14="http://schemas.microsoft.com/office/mac/drawingml/2011/main" val="1"/>
+                <ma14:wrappingTextBoxFlag xmlns:ma14="http://schemas.microsoft.com/office/mac/drawingml/2011/main" xmlns:a14="http://schemas.microsoft.com/office/drawing/2010/main" xmlns:m="http://schemas.openxmlformats.org/officeDocument/2006/math" xmlns="" val="1"/>
               </a:ext>
             </a:extLst>
           </p:spPr>

</xml_diff>

<commit_message>
02 languages: updated JS intro
</commit_message>
<xml_diff>
--- a/02-languages/01-teoria/01 Introducción a Javascript.pptx
+++ b/02-languages/01-teoria/01 Introducción a Javascript.pptx
@@ -2211,7 +2211,7 @@
           </a:ln>
           <a:extLst>
             <a:ext uri="{C572A759-6A51-4108-AA02-DFA0A04FC94B}">
-              <ma14:wrappingTextBoxFlag xmlns:ma14="http://schemas.microsoft.com/office/mac/drawingml/2011/main" xmlns:a14="http://schemas.microsoft.com/office/drawing/2010/main" xmlns:m="http://schemas.openxmlformats.org/officeDocument/2006/math" xmlns="" val="1"/>
+              <ma14:wrappingTextBoxFlag xmlns="" xmlns:m="http://schemas.openxmlformats.org/officeDocument/2006/math" xmlns:a14="http://schemas.microsoft.com/office/drawing/2010/main" xmlns:ma14="http://schemas.microsoft.com/office/mac/drawingml/2011/main" val="1"/>
             </a:ext>
           </a:extLst>
         </p:spPr>
@@ -2250,7 +2250,7 @@
           </a:ln>
           <a:extLst>
             <a:ext uri="{C572A759-6A51-4108-AA02-DFA0A04FC94B}">
-              <ma14:wrappingTextBoxFlag xmlns:ma14="http://schemas.microsoft.com/office/mac/drawingml/2011/main" xmlns:a14="http://schemas.microsoft.com/office/drawing/2010/main" xmlns:m="http://schemas.openxmlformats.org/officeDocument/2006/math" xmlns="" val="1"/>
+              <ma14:wrappingTextBoxFlag xmlns="" xmlns:m="http://schemas.openxmlformats.org/officeDocument/2006/math" xmlns:a14="http://schemas.microsoft.com/office/drawing/2010/main" xmlns:ma14="http://schemas.microsoft.com/office/mac/drawingml/2011/main" val="1"/>
             </a:ext>
           </a:extLst>
         </p:spPr>
@@ -3208,7 +3208,7 @@
           </a:ln>
           <a:extLst>
             <a:ext uri="{C572A759-6A51-4108-AA02-DFA0A04FC94B}">
-              <ma14:wrappingTextBoxFlag xmlns:ma14="http://schemas.microsoft.com/office/mac/drawingml/2011/main" xmlns:a14="http://schemas.microsoft.com/office/drawing/2010/main" xmlns:m="http://schemas.openxmlformats.org/officeDocument/2006/math" xmlns="" val="1"/>
+              <ma14:wrappingTextBoxFlag xmlns="" xmlns:m="http://schemas.openxmlformats.org/officeDocument/2006/math" xmlns:a14="http://schemas.microsoft.com/office/drawing/2010/main" xmlns:ma14="http://schemas.microsoft.com/office/mac/drawingml/2011/main" val="1"/>
             </a:ext>
           </a:extLst>
         </p:spPr>
@@ -3258,7 +3258,7 @@
           </a:ln>
           <a:extLst>
             <a:ext uri="{C572A759-6A51-4108-AA02-DFA0A04FC94B}">
-              <ma14:wrappingTextBoxFlag xmlns:ma14="http://schemas.microsoft.com/office/mac/drawingml/2011/main" xmlns:a14="http://schemas.microsoft.com/office/drawing/2010/main" xmlns:m="http://schemas.openxmlformats.org/officeDocument/2006/math" xmlns="" val="1"/>
+              <ma14:wrappingTextBoxFlag xmlns="" xmlns:m="http://schemas.openxmlformats.org/officeDocument/2006/math" xmlns:a14="http://schemas.microsoft.com/office/drawing/2010/main" xmlns:ma14="http://schemas.microsoft.com/office/mac/drawingml/2011/main" val="1"/>
             </a:ext>
           </a:extLst>
         </p:spPr>
@@ -3527,7 +3527,7 @@
             <a:effectLst/>
             <a:extLst>
               <a:ext uri="{C572A759-6A51-4108-AA02-DFA0A04FC94B}">
-                <ma14:wrappingTextBoxFlag xmlns:ma14="http://schemas.microsoft.com/office/mac/drawingml/2011/main" xmlns:a14="http://schemas.microsoft.com/office/drawing/2010/main" xmlns:m="http://schemas.openxmlformats.org/officeDocument/2006/math" xmlns="" val="1"/>
+                <ma14:wrappingTextBoxFlag xmlns="" xmlns:m="http://schemas.openxmlformats.org/officeDocument/2006/math" xmlns:a14="http://schemas.microsoft.com/office/drawing/2010/main" xmlns:ma14="http://schemas.microsoft.com/office/mac/drawingml/2011/main" val="1"/>
               </a:ext>
             </a:extLst>
           </p:spPr>
@@ -3640,7 +3640,7 @@
             <a:effectLst/>
             <a:extLst>
               <a:ext uri="{C572A759-6A51-4108-AA02-DFA0A04FC94B}">
-                <ma14:wrappingTextBoxFlag xmlns:ma14="http://schemas.microsoft.com/office/mac/drawingml/2011/main" xmlns:a14="http://schemas.microsoft.com/office/drawing/2010/main" xmlns:m="http://schemas.openxmlformats.org/officeDocument/2006/math" xmlns="" val="1"/>
+                <ma14:wrappingTextBoxFlag xmlns="" xmlns:m="http://schemas.openxmlformats.org/officeDocument/2006/math" xmlns:a14="http://schemas.microsoft.com/office/drawing/2010/main" xmlns:ma14="http://schemas.microsoft.com/office/mac/drawingml/2011/main" val="1"/>
               </a:ext>
             </a:extLst>
           </p:spPr>
@@ -3755,7 +3755,7 @@
             <a:effectLst/>
             <a:extLst>
               <a:ext uri="{C572A759-6A51-4108-AA02-DFA0A04FC94B}">
-                <ma14:wrappingTextBoxFlag xmlns:ma14="http://schemas.microsoft.com/office/mac/drawingml/2011/main" xmlns:a14="http://schemas.microsoft.com/office/drawing/2010/main" xmlns:m="http://schemas.openxmlformats.org/officeDocument/2006/math" xmlns="" val="1"/>
+                <ma14:wrappingTextBoxFlag xmlns="" xmlns:m="http://schemas.openxmlformats.org/officeDocument/2006/math" xmlns:a14="http://schemas.microsoft.com/office/drawing/2010/main" xmlns:ma14="http://schemas.microsoft.com/office/mac/drawingml/2011/main" val="1"/>
               </a:ext>
             </a:extLst>
           </p:spPr>
@@ -3866,7 +3866,7 @@
             <a:effectLst/>
             <a:extLst>
               <a:ext uri="{C572A759-6A51-4108-AA02-DFA0A04FC94B}">
-                <ma14:wrappingTextBoxFlag xmlns:ma14="http://schemas.microsoft.com/office/mac/drawingml/2011/main" xmlns:a14="http://schemas.microsoft.com/office/drawing/2010/main" xmlns:m="http://schemas.openxmlformats.org/officeDocument/2006/math" xmlns="" val="1"/>
+                <ma14:wrappingTextBoxFlag xmlns="" xmlns:m="http://schemas.openxmlformats.org/officeDocument/2006/math" xmlns:a14="http://schemas.microsoft.com/office/drawing/2010/main" xmlns:ma14="http://schemas.microsoft.com/office/mac/drawingml/2011/main" val="1"/>
               </a:ext>
             </a:extLst>
           </p:spPr>
@@ -3980,7 +3980,7 @@
             <a:effectLst/>
             <a:extLst>
               <a:ext uri="{C572A759-6A51-4108-AA02-DFA0A04FC94B}">
-                <ma14:wrappingTextBoxFlag xmlns:ma14="http://schemas.microsoft.com/office/mac/drawingml/2011/main" xmlns:a14="http://schemas.microsoft.com/office/drawing/2010/main" xmlns:m="http://schemas.openxmlformats.org/officeDocument/2006/math" xmlns="" val="1"/>
+                <ma14:wrappingTextBoxFlag xmlns="" xmlns:m="http://schemas.openxmlformats.org/officeDocument/2006/math" xmlns:a14="http://schemas.microsoft.com/office/drawing/2010/main" xmlns:ma14="http://schemas.microsoft.com/office/mac/drawingml/2011/main" val="1"/>
               </a:ext>
             </a:extLst>
           </p:spPr>
@@ -4091,7 +4091,7 @@
             <a:effectLst/>
             <a:extLst>
               <a:ext uri="{C572A759-6A51-4108-AA02-DFA0A04FC94B}">
-                <ma14:wrappingTextBoxFlag xmlns:ma14="http://schemas.microsoft.com/office/mac/drawingml/2011/main" xmlns:a14="http://schemas.microsoft.com/office/drawing/2010/main" xmlns:m="http://schemas.openxmlformats.org/officeDocument/2006/math" xmlns="" val="1"/>
+                <ma14:wrappingTextBoxFlag xmlns="" xmlns:m="http://schemas.openxmlformats.org/officeDocument/2006/math" xmlns:a14="http://schemas.microsoft.com/office/drawing/2010/main" xmlns:ma14="http://schemas.microsoft.com/office/mac/drawingml/2011/main" val="1"/>
               </a:ext>
             </a:extLst>
           </p:spPr>
@@ -4278,7 +4278,7 @@
           </a:ln>
           <a:extLst>
             <a:ext uri="{C572A759-6A51-4108-AA02-DFA0A04FC94B}">
-              <ma14:wrappingTextBoxFlag xmlns:ma14="http://schemas.microsoft.com/office/mac/drawingml/2011/main" xmlns:a14="http://schemas.microsoft.com/office/drawing/2010/main" xmlns:m="http://schemas.openxmlformats.org/officeDocument/2006/math" xmlns="" val="1"/>
+              <ma14:wrappingTextBoxFlag xmlns="" xmlns:m="http://schemas.openxmlformats.org/officeDocument/2006/math" xmlns:a14="http://schemas.microsoft.com/office/drawing/2010/main" xmlns:ma14="http://schemas.microsoft.com/office/mac/drawingml/2011/main" val="1"/>
             </a:ext>
           </a:extLst>
         </p:spPr>
@@ -4334,7 +4334,7 @@
           </a:ln>
           <a:extLst>
             <a:ext uri="{C572A759-6A51-4108-AA02-DFA0A04FC94B}">
-              <ma14:wrappingTextBoxFlag xmlns:ma14="http://schemas.microsoft.com/office/mac/drawingml/2011/main" xmlns:a14="http://schemas.microsoft.com/office/drawing/2010/main" xmlns:m="http://schemas.openxmlformats.org/officeDocument/2006/math" xmlns="" val="1"/>
+              <ma14:wrappingTextBoxFlag xmlns="" xmlns:m="http://schemas.openxmlformats.org/officeDocument/2006/math" xmlns:a14="http://schemas.microsoft.com/office/drawing/2010/main" xmlns:ma14="http://schemas.microsoft.com/office/mac/drawingml/2011/main" val="1"/>
             </a:ext>
           </a:extLst>
         </p:spPr>
@@ -4436,7 +4436,7 @@
           </a:ln>
           <a:extLst>
             <a:ext uri="{C572A759-6A51-4108-AA02-DFA0A04FC94B}">
-              <ma14:wrappingTextBoxFlag xmlns:ma14="http://schemas.microsoft.com/office/mac/drawingml/2011/main" xmlns:a14="http://schemas.microsoft.com/office/drawing/2010/main" xmlns:m="http://schemas.openxmlformats.org/officeDocument/2006/math" xmlns="" val="1"/>
+              <ma14:wrappingTextBoxFlag xmlns="" xmlns:m="http://schemas.openxmlformats.org/officeDocument/2006/math" xmlns:a14="http://schemas.microsoft.com/office/drawing/2010/main" xmlns:ma14="http://schemas.microsoft.com/office/mac/drawingml/2011/main" val="1"/>
             </a:ext>
           </a:extLst>
         </p:spPr>
@@ -4486,7 +4486,7 @@
           </a:ln>
           <a:extLst>
             <a:ext uri="{C572A759-6A51-4108-AA02-DFA0A04FC94B}">
-              <ma14:wrappingTextBoxFlag xmlns:ma14="http://schemas.microsoft.com/office/mac/drawingml/2011/main" xmlns:a14="http://schemas.microsoft.com/office/drawing/2010/main" xmlns:m="http://schemas.openxmlformats.org/officeDocument/2006/math" xmlns="" val="1"/>
+              <ma14:wrappingTextBoxFlag xmlns="" xmlns:m="http://schemas.openxmlformats.org/officeDocument/2006/math" xmlns:a14="http://schemas.microsoft.com/office/drawing/2010/main" xmlns:ma14="http://schemas.microsoft.com/office/mac/drawingml/2011/main" val="1"/>
             </a:ext>
           </a:extLst>
         </p:spPr>
@@ -4561,7 +4561,7 @@
           </a:ln>
           <a:extLst>
             <a:ext uri="{C572A759-6A51-4108-AA02-DFA0A04FC94B}">
-              <ma14:wrappingTextBoxFlag xmlns:ma14="http://schemas.microsoft.com/office/mac/drawingml/2011/main" xmlns:a14="http://schemas.microsoft.com/office/drawing/2010/main" xmlns:m="http://schemas.openxmlformats.org/officeDocument/2006/math" xmlns="" val="1"/>
+              <ma14:wrappingTextBoxFlag xmlns="" xmlns:m="http://schemas.openxmlformats.org/officeDocument/2006/math" xmlns:a14="http://schemas.microsoft.com/office/drawing/2010/main" xmlns:ma14="http://schemas.microsoft.com/office/mac/drawingml/2011/main" val="1"/>
             </a:ext>
           </a:extLst>
         </p:spPr>
@@ -4648,7 +4648,7 @@
           </a:ln>
           <a:extLst>
             <a:ext uri="{C572A759-6A51-4108-AA02-DFA0A04FC94B}">
-              <ma14:wrappingTextBoxFlag xmlns:ma14="http://schemas.microsoft.com/office/mac/drawingml/2011/main" xmlns:a14="http://schemas.microsoft.com/office/drawing/2010/main" xmlns:m="http://schemas.openxmlformats.org/officeDocument/2006/math" xmlns="" val="1"/>
+              <ma14:wrappingTextBoxFlag xmlns="" xmlns:m="http://schemas.openxmlformats.org/officeDocument/2006/math" xmlns:a14="http://schemas.microsoft.com/office/drawing/2010/main" xmlns:ma14="http://schemas.microsoft.com/office/mac/drawingml/2011/main" val="1"/>
             </a:ext>
           </a:extLst>
         </p:spPr>
@@ -4708,7 +4708,7 @@
           </a:ln>
           <a:extLst>
             <a:ext uri="{C572A759-6A51-4108-AA02-DFA0A04FC94B}">
-              <ma14:wrappingTextBoxFlag xmlns:ma14="http://schemas.microsoft.com/office/mac/drawingml/2011/main" xmlns:a14="http://schemas.microsoft.com/office/drawing/2010/main" xmlns:m="http://schemas.openxmlformats.org/officeDocument/2006/math" xmlns="" val="1"/>
+              <ma14:wrappingTextBoxFlag xmlns="" xmlns:m="http://schemas.openxmlformats.org/officeDocument/2006/math" xmlns:a14="http://schemas.microsoft.com/office/drawing/2010/main" xmlns:ma14="http://schemas.microsoft.com/office/mac/drawingml/2011/main" val="1"/>
             </a:ext>
           </a:extLst>
         </p:spPr>
@@ -4761,7 +4761,7 @@
           </a:ln>
           <a:extLst>
             <a:ext uri="{C572A759-6A51-4108-AA02-DFA0A04FC94B}">
-              <ma14:wrappingTextBoxFlag xmlns:ma14="http://schemas.microsoft.com/office/mac/drawingml/2011/main" xmlns:a14="http://schemas.microsoft.com/office/drawing/2010/main" xmlns:m="http://schemas.openxmlformats.org/officeDocument/2006/math" xmlns="" val="1"/>
+              <ma14:wrappingTextBoxFlag xmlns="" xmlns:m="http://schemas.openxmlformats.org/officeDocument/2006/math" xmlns:a14="http://schemas.microsoft.com/office/drawing/2010/main" xmlns:ma14="http://schemas.microsoft.com/office/mac/drawingml/2011/main" val="1"/>
             </a:ext>
           </a:extLst>
         </p:spPr>
@@ -4811,7 +4811,7 @@
           </a:ln>
           <a:extLst>
             <a:ext uri="{C572A759-6A51-4108-AA02-DFA0A04FC94B}">
-              <ma14:wrappingTextBoxFlag xmlns:ma14="http://schemas.microsoft.com/office/mac/drawingml/2011/main" xmlns:a14="http://schemas.microsoft.com/office/drawing/2010/main" xmlns:m="http://schemas.openxmlformats.org/officeDocument/2006/math" xmlns="" val="1"/>
+              <ma14:wrappingTextBoxFlag xmlns="" xmlns:m="http://schemas.openxmlformats.org/officeDocument/2006/math" xmlns:a14="http://schemas.microsoft.com/office/drawing/2010/main" xmlns:ma14="http://schemas.microsoft.com/office/mac/drawingml/2011/main" val="1"/>
             </a:ext>
           </a:extLst>
         </p:spPr>
@@ -4861,7 +4861,7 @@
           </a:ln>
           <a:extLst>
             <a:ext uri="{C572A759-6A51-4108-AA02-DFA0A04FC94B}">
-              <ma14:wrappingTextBoxFlag xmlns:ma14="http://schemas.microsoft.com/office/mac/drawingml/2011/main" xmlns:a14="http://schemas.microsoft.com/office/drawing/2010/main" xmlns:m="http://schemas.openxmlformats.org/officeDocument/2006/math" xmlns="" val="1"/>
+              <ma14:wrappingTextBoxFlag xmlns="" xmlns:m="http://schemas.openxmlformats.org/officeDocument/2006/math" xmlns:a14="http://schemas.microsoft.com/office/drawing/2010/main" xmlns:ma14="http://schemas.microsoft.com/office/mac/drawingml/2011/main" val="1"/>
             </a:ext>
           </a:extLst>
         </p:spPr>
@@ -5040,7 +5040,7 @@
             <a:effectLst/>
             <a:extLst>
               <a:ext uri="{C572A759-6A51-4108-AA02-DFA0A04FC94B}">
-                <ma14:wrappingTextBoxFlag xmlns:ma14="http://schemas.microsoft.com/office/mac/drawingml/2011/main" xmlns:a14="http://schemas.microsoft.com/office/drawing/2010/main" xmlns:m="http://schemas.openxmlformats.org/officeDocument/2006/math" xmlns="" val="1"/>
+                <ma14:wrappingTextBoxFlag xmlns="" xmlns:m="http://schemas.openxmlformats.org/officeDocument/2006/math" xmlns:a14="http://schemas.microsoft.com/office/drawing/2010/main" xmlns:ma14="http://schemas.microsoft.com/office/mac/drawingml/2011/main" val="1"/>
               </a:ext>
             </a:extLst>
           </p:spPr>
@@ -5092,7 +5092,7 @@
             <a:effectLst/>
             <a:extLst>
               <a:ext uri="{C572A759-6A51-4108-AA02-DFA0A04FC94B}">
-                <ma14:wrappingTextBoxFlag xmlns:ma14="http://schemas.microsoft.com/office/mac/drawingml/2011/main" xmlns:a14="http://schemas.microsoft.com/office/drawing/2010/main" xmlns:m="http://schemas.openxmlformats.org/officeDocument/2006/math" xmlns="" val="1"/>
+                <ma14:wrappingTextBoxFlag xmlns="" xmlns:m="http://schemas.openxmlformats.org/officeDocument/2006/math" xmlns:a14="http://schemas.microsoft.com/office/drawing/2010/main" xmlns:ma14="http://schemas.microsoft.com/office/mac/drawingml/2011/main" val="1"/>
               </a:ext>
             </a:extLst>
           </p:spPr>
@@ -5195,7 +5195,7 @@
             <a:effectLst/>
             <a:extLst>
               <a:ext uri="{C572A759-6A51-4108-AA02-DFA0A04FC94B}">
-                <ma14:wrappingTextBoxFlag xmlns:ma14="http://schemas.microsoft.com/office/mac/drawingml/2011/main" xmlns:a14="http://schemas.microsoft.com/office/drawing/2010/main" xmlns:m="http://schemas.openxmlformats.org/officeDocument/2006/math" xmlns="" val="1"/>
+                <ma14:wrappingTextBoxFlag xmlns="" xmlns:m="http://schemas.openxmlformats.org/officeDocument/2006/math" xmlns:a14="http://schemas.microsoft.com/office/drawing/2010/main" xmlns:ma14="http://schemas.microsoft.com/office/mac/drawingml/2011/main" val="1"/>
               </a:ext>
             </a:extLst>
           </p:spPr>
@@ -5245,7 +5245,7 @@
             <a:effectLst/>
             <a:extLst>
               <a:ext uri="{C572A759-6A51-4108-AA02-DFA0A04FC94B}">
-                <ma14:wrappingTextBoxFlag xmlns:ma14="http://schemas.microsoft.com/office/mac/drawingml/2011/main" xmlns:a14="http://schemas.microsoft.com/office/drawing/2010/main" xmlns:m="http://schemas.openxmlformats.org/officeDocument/2006/math" xmlns="" val="1"/>
+                <ma14:wrappingTextBoxFlag xmlns="" xmlns:m="http://schemas.openxmlformats.org/officeDocument/2006/math" xmlns:a14="http://schemas.microsoft.com/office/drawing/2010/main" xmlns:ma14="http://schemas.microsoft.com/office/mac/drawingml/2011/main" val="1"/>
               </a:ext>
             </a:extLst>
           </p:spPr>
@@ -5348,7 +5348,7 @@
             <a:effectLst/>
             <a:extLst>
               <a:ext uri="{C572A759-6A51-4108-AA02-DFA0A04FC94B}">
-                <ma14:wrappingTextBoxFlag xmlns:ma14="http://schemas.microsoft.com/office/mac/drawingml/2011/main" xmlns:a14="http://schemas.microsoft.com/office/drawing/2010/main" xmlns:m="http://schemas.openxmlformats.org/officeDocument/2006/math" xmlns="" val="1"/>
+                <ma14:wrappingTextBoxFlag xmlns="" xmlns:m="http://schemas.openxmlformats.org/officeDocument/2006/math" xmlns:a14="http://schemas.microsoft.com/office/drawing/2010/main" xmlns:ma14="http://schemas.microsoft.com/office/mac/drawingml/2011/main" val="1"/>
               </a:ext>
             </a:extLst>
           </p:spPr>
@@ -5397,7 +5397,7 @@
             <a:effectLst/>
             <a:extLst>
               <a:ext uri="{C572A759-6A51-4108-AA02-DFA0A04FC94B}">
-                <ma14:wrappingTextBoxFlag xmlns:ma14="http://schemas.microsoft.com/office/mac/drawingml/2011/main" xmlns:a14="http://schemas.microsoft.com/office/drawing/2010/main" xmlns:m="http://schemas.openxmlformats.org/officeDocument/2006/math" xmlns="" val="1"/>
+                <ma14:wrappingTextBoxFlag xmlns="" xmlns:m="http://schemas.openxmlformats.org/officeDocument/2006/math" xmlns:a14="http://schemas.microsoft.com/office/drawing/2010/main" xmlns:ma14="http://schemas.microsoft.com/office/mac/drawingml/2011/main" val="1"/>
               </a:ext>
             </a:extLst>
           </p:spPr>
@@ -5525,7 +5525,7 @@
             <a:effectLst/>
             <a:extLst>
               <a:ext uri="{C572A759-6A51-4108-AA02-DFA0A04FC94B}">
-                <ma14:wrappingTextBoxFlag xmlns:ma14="http://schemas.microsoft.com/office/mac/drawingml/2011/main" xmlns:a14="http://schemas.microsoft.com/office/drawing/2010/main" xmlns:m="http://schemas.openxmlformats.org/officeDocument/2006/math" xmlns="" val="1"/>
+                <ma14:wrappingTextBoxFlag xmlns="" xmlns:m="http://schemas.openxmlformats.org/officeDocument/2006/math" xmlns:a14="http://schemas.microsoft.com/office/drawing/2010/main" xmlns:ma14="http://schemas.microsoft.com/office/mac/drawingml/2011/main" val="1"/>
               </a:ext>
             </a:extLst>
           </p:spPr>
@@ -5575,7 +5575,7 @@
             <a:effectLst/>
             <a:extLst>
               <a:ext uri="{C572A759-6A51-4108-AA02-DFA0A04FC94B}">
-                <ma14:wrappingTextBoxFlag xmlns:ma14="http://schemas.microsoft.com/office/mac/drawingml/2011/main" xmlns:a14="http://schemas.microsoft.com/office/drawing/2010/main" xmlns:m="http://schemas.openxmlformats.org/officeDocument/2006/math" xmlns="" val="1"/>
+                <ma14:wrappingTextBoxFlag xmlns="" xmlns:m="http://schemas.openxmlformats.org/officeDocument/2006/math" xmlns:a14="http://schemas.microsoft.com/office/drawing/2010/main" xmlns:ma14="http://schemas.microsoft.com/office/mac/drawingml/2011/main" val="1"/>
               </a:ext>
             </a:extLst>
           </p:spPr>
@@ -5678,7 +5678,7 @@
             <a:effectLst/>
             <a:extLst>
               <a:ext uri="{C572A759-6A51-4108-AA02-DFA0A04FC94B}">
-                <ma14:wrappingTextBoxFlag xmlns:ma14="http://schemas.microsoft.com/office/mac/drawingml/2011/main" xmlns:a14="http://schemas.microsoft.com/office/drawing/2010/main" xmlns:m="http://schemas.openxmlformats.org/officeDocument/2006/math" xmlns="" val="1"/>
+                <ma14:wrappingTextBoxFlag xmlns="" xmlns:m="http://schemas.openxmlformats.org/officeDocument/2006/math" xmlns:a14="http://schemas.microsoft.com/office/drawing/2010/main" xmlns:ma14="http://schemas.microsoft.com/office/mac/drawingml/2011/main" val="1"/>
               </a:ext>
             </a:extLst>
           </p:spPr>
@@ -5728,7 +5728,7 @@
             <a:effectLst/>
             <a:extLst>
               <a:ext uri="{C572A759-6A51-4108-AA02-DFA0A04FC94B}">
-                <ma14:wrappingTextBoxFlag xmlns:ma14="http://schemas.microsoft.com/office/mac/drawingml/2011/main" xmlns:a14="http://schemas.microsoft.com/office/drawing/2010/main" xmlns:m="http://schemas.openxmlformats.org/officeDocument/2006/math" xmlns="" val="1"/>
+                <ma14:wrappingTextBoxFlag xmlns="" xmlns:m="http://schemas.openxmlformats.org/officeDocument/2006/math" xmlns:a14="http://schemas.microsoft.com/office/drawing/2010/main" xmlns:ma14="http://schemas.microsoft.com/office/mac/drawingml/2011/main" val="1"/>
               </a:ext>
             </a:extLst>
           </p:spPr>
@@ -5832,7 +5832,7 @@
             <a:effectLst/>
             <a:extLst>
               <a:ext uri="{C572A759-6A51-4108-AA02-DFA0A04FC94B}">
-                <ma14:wrappingTextBoxFlag xmlns:ma14="http://schemas.microsoft.com/office/mac/drawingml/2011/main" xmlns:a14="http://schemas.microsoft.com/office/drawing/2010/main" xmlns:m="http://schemas.openxmlformats.org/officeDocument/2006/math" xmlns="" val="1"/>
+                <ma14:wrappingTextBoxFlag xmlns="" xmlns:m="http://schemas.openxmlformats.org/officeDocument/2006/math" xmlns:a14="http://schemas.microsoft.com/office/drawing/2010/main" xmlns:ma14="http://schemas.microsoft.com/office/mac/drawingml/2011/main" val="1"/>
               </a:ext>
             </a:extLst>
           </p:spPr>
@@ -5882,7 +5882,7 @@
             <a:effectLst/>
             <a:extLst>
               <a:ext uri="{C572A759-6A51-4108-AA02-DFA0A04FC94B}">
-                <ma14:wrappingTextBoxFlag xmlns:ma14="http://schemas.microsoft.com/office/mac/drawingml/2011/main" xmlns:a14="http://schemas.microsoft.com/office/drawing/2010/main" xmlns:m="http://schemas.openxmlformats.org/officeDocument/2006/math" xmlns="" val="1"/>
+                <ma14:wrappingTextBoxFlag xmlns="" xmlns:m="http://schemas.openxmlformats.org/officeDocument/2006/math" xmlns:a14="http://schemas.microsoft.com/office/drawing/2010/main" xmlns:ma14="http://schemas.microsoft.com/office/mac/drawingml/2011/main" val="1"/>
               </a:ext>
             </a:extLst>
           </p:spPr>
@@ -5985,7 +5985,7 @@
             <a:effectLst/>
             <a:extLst>
               <a:ext uri="{C572A759-6A51-4108-AA02-DFA0A04FC94B}">
-                <ma14:wrappingTextBoxFlag xmlns:ma14="http://schemas.microsoft.com/office/mac/drawingml/2011/main" xmlns:a14="http://schemas.microsoft.com/office/drawing/2010/main" xmlns:m="http://schemas.openxmlformats.org/officeDocument/2006/math" xmlns="" val="1"/>
+                <ma14:wrappingTextBoxFlag xmlns="" xmlns:m="http://schemas.openxmlformats.org/officeDocument/2006/math" xmlns:a14="http://schemas.microsoft.com/office/drawing/2010/main" xmlns:ma14="http://schemas.microsoft.com/office/mac/drawingml/2011/main" val="1"/>
               </a:ext>
             </a:extLst>
           </p:spPr>
@@ -6035,7 +6035,7 @@
             <a:effectLst/>
             <a:extLst>
               <a:ext uri="{C572A759-6A51-4108-AA02-DFA0A04FC94B}">
-                <ma14:wrappingTextBoxFlag xmlns:ma14="http://schemas.microsoft.com/office/mac/drawingml/2011/main" xmlns:a14="http://schemas.microsoft.com/office/drawing/2010/main" xmlns:m="http://schemas.openxmlformats.org/officeDocument/2006/math" xmlns="" val="1"/>
+                <ma14:wrappingTextBoxFlag xmlns="" xmlns:m="http://schemas.openxmlformats.org/officeDocument/2006/math" xmlns:a14="http://schemas.microsoft.com/office/drawing/2010/main" xmlns:ma14="http://schemas.microsoft.com/office/mac/drawingml/2011/main" val="1"/>
               </a:ext>
             </a:extLst>
           </p:spPr>
@@ -6138,7 +6138,7 @@
             <a:effectLst/>
             <a:extLst>
               <a:ext uri="{C572A759-6A51-4108-AA02-DFA0A04FC94B}">
-                <ma14:wrappingTextBoxFlag xmlns:ma14="http://schemas.microsoft.com/office/mac/drawingml/2011/main" xmlns:a14="http://schemas.microsoft.com/office/drawing/2010/main" xmlns:m="http://schemas.openxmlformats.org/officeDocument/2006/math" xmlns="" val="1"/>
+                <ma14:wrappingTextBoxFlag xmlns="" xmlns:m="http://schemas.openxmlformats.org/officeDocument/2006/math" xmlns:a14="http://schemas.microsoft.com/office/drawing/2010/main" xmlns:ma14="http://schemas.microsoft.com/office/mac/drawingml/2011/main" val="1"/>
               </a:ext>
             </a:extLst>
           </p:spPr>
@@ -6188,7 +6188,7 @@
             <a:effectLst/>
             <a:extLst>
               <a:ext uri="{C572A759-6A51-4108-AA02-DFA0A04FC94B}">
-                <ma14:wrappingTextBoxFlag xmlns:ma14="http://schemas.microsoft.com/office/mac/drawingml/2011/main" xmlns:a14="http://schemas.microsoft.com/office/drawing/2010/main" xmlns:m="http://schemas.openxmlformats.org/officeDocument/2006/math" xmlns="" val="1"/>
+                <ma14:wrappingTextBoxFlag xmlns="" xmlns:m="http://schemas.openxmlformats.org/officeDocument/2006/math" xmlns:a14="http://schemas.microsoft.com/office/drawing/2010/main" xmlns:ma14="http://schemas.microsoft.com/office/mac/drawingml/2011/main" val="1"/>
               </a:ext>
             </a:extLst>
           </p:spPr>
@@ -6291,7 +6291,7 @@
             <a:effectLst/>
             <a:extLst>
               <a:ext uri="{C572A759-6A51-4108-AA02-DFA0A04FC94B}">
-                <ma14:wrappingTextBoxFlag xmlns:ma14="http://schemas.microsoft.com/office/mac/drawingml/2011/main" xmlns:a14="http://schemas.microsoft.com/office/drawing/2010/main" xmlns:m="http://schemas.openxmlformats.org/officeDocument/2006/math" xmlns="" val="1"/>
+                <ma14:wrappingTextBoxFlag xmlns="" xmlns:m="http://schemas.openxmlformats.org/officeDocument/2006/math" xmlns:a14="http://schemas.microsoft.com/office/drawing/2010/main" xmlns:ma14="http://schemas.microsoft.com/office/mac/drawingml/2011/main" val="1"/>
               </a:ext>
             </a:extLst>
           </p:spPr>
@@ -6340,7 +6340,7 @@
             <a:effectLst/>
             <a:extLst>
               <a:ext uri="{C572A759-6A51-4108-AA02-DFA0A04FC94B}">
-                <ma14:wrappingTextBoxFlag xmlns:ma14="http://schemas.microsoft.com/office/mac/drawingml/2011/main" xmlns:a14="http://schemas.microsoft.com/office/drawing/2010/main" xmlns:m="http://schemas.openxmlformats.org/officeDocument/2006/math" xmlns="" val="1"/>
+                <ma14:wrappingTextBoxFlag xmlns="" xmlns:m="http://schemas.openxmlformats.org/officeDocument/2006/math" xmlns:a14="http://schemas.microsoft.com/office/drawing/2010/main" xmlns:ma14="http://schemas.microsoft.com/office/mac/drawingml/2011/main" val="1"/>
               </a:ext>
             </a:extLst>
           </p:spPr>
@@ -6601,7 +6601,7 @@
             <a:effectLst/>
             <a:extLst>
               <a:ext uri="{C572A759-6A51-4108-AA02-DFA0A04FC94B}">
-                <ma14:wrappingTextBoxFlag xmlns:ma14="http://schemas.microsoft.com/office/mac/drawingml/2011/main" xmlns:a14="http://schemas.microsoft.com/office/drawing/2010/main" xmlns:m="http://schemas.openxmlformats.org/officeDocument/2006/math" xmlns="" val="1"/>
+                <ma14:wrappingTextBoxFlag xmlns="" xmlns:m="http://schemas.openxmlformats.org/officeDocument/2006/math" xmlns:a14="http://schemas.microsoft.com/office/drawing/2010/main" xmlns:ma14="http://schemas.microsoft.com/office/mac/drawingml/2011/main" val="1"/>
               </a:ext>
             </a:extLst>
           </p:spPr>
@@ -6744,7 +6744,7 @@
             <a:effectLst/>
             <a:extLst>
               <a:ext uri="{C572A759-6A51-4108-AA02-DFA0A04FC94B}">
-                <ma14:wrappingTextBoxFlag xmlns:ma14="http://schemas.microsoft.com/office/mac/drawingml/2011/main" xmlns:a14="http://schemas.microsoft.com/office/drawing/2010/main" xmlns:m="http://schemas.openxmlformats.org/officeDocument/2006/math" xmlns="" val="1"/>
+                <ma14:wrappingTextBoxFlag xmlns="" xmlns:m="http://schemas.openxmlformats.org/officeDocument/2006/math" xmlns:a14="http://schemas.microsoft.com/office/drawing/2010/main" xmlns:ma14="http://schemas.microsoft.com/office/mac/drawingml/2011/main" val="1"/>
               </a:ext>
             </a:extLst>
           </p:spPr>
@@ -6872,7 +6872,7 @@
               <a:effectLst/>
               <a:extLst>
                 <a:ext uri="{C572A759-6A51-4108-AA02-DFA0A04FC94B}">
-                  <ma14:wrappingTextBoxFlag xmlns:ma14="http://schemas.microsoft.com/office/mac/drawingml/2011/main" xmlns:a14="http://schemas.microsoft.com/office/drawing/2010/main" xmlns:m="http://schemas.openxmlformats.org/officeDocument/2006/math" xmlns="" val="1"/>
+                  <ma14:wrappingTextBoxFlag xmlns="" xmlns:m="http://schemas.openxmlformats.org/officeDocument/2006/math" xmlns:a14="http://schemas.microsoft.com/office/drawing/2010/main" xmlns:ma14="http://schemas.microsoft.com/office/mac/drawingml/2011/main" val="1"/>
                 </a:ext>
               </a:extLst>
             </p:spPr>
@@ -6984,7 +6984,7 @@
               <a:effectLst/>
               <a:extLst>
                 <a:ext uri="{C572A759-6A51-4108-AA02-DFA0A04FC94B}">
-                  <ma14:wrappingTextBoxFlag xmlns:ma14="http://schemas.microsoft.com/office/mac/drawingml/2011/main" xmlns:a14="http://schemas.microsoft.com/office/drawing/2010/main" xmlns:m="http://schemas.openxmlformats.org/officeDocument/2006/math" xmlns="" val="1"/>
+                  <ma14:wrappingTextBoxFlag xmlns="" xmlns:m="http://schemas.openxmlformats.org/officeDocument/2006/math" xmlns:a14="http://schemas.microsoft.com/office/drawing/2010/main" xmlns:ma14="http://schemas.microsoft.com/office/mac/drawingml/2011/main" val="1"/>
                 </a:ext>
               </a:extLst>
             </p:spPr>
@@ -7036,7 +7036,7 @@
             <a:effectLst/>
             <a:extLst>
               <a:ext uri="{C572A759-6A51-4108-AA02-DFA0A04FC94B}">
-                <ma14:wrappingTextBoxFlag xmlns:ma14="http://schemas.microsoft.com/office/mac/drawingml/2011/main" xmlns:a14="http://schemas.microsoft.com/office/drawing/2010/main" xmlns:m="http://schemas.openxmlformats.org/officeDocument/2006/math" xmlns="" val="1"/>
+                <ma14:wrappingTextBoxFlag xmlns="" xmlns:m="http://schemas.openxmlformats.org/officeDocument/2006/math" xmlns:a14="http://schemas.microsoft.com/office/drawing/2010/main" xmlns:ma14="http://schemas.microsoft.com/office/mac/drawingml/2011/main" val="1"/>
               </a:ext>
             </a:extLst>
           </p:spPr>
@@ -7158,7 +7158,7 @@
             <a:effectLst/>
             <a:extLst>
               <a:ext uri="{C572A759-6A51-4108-AA02-DFA0A04FC94B}">
-                <ma14:wrappingTextBoxFlag xmlns:ma14="http://schemas.microsoft.com/office/mac/drawingml/2011/main" xmlns:a14="http://schemas.microsoft.com/office/drawing/2010/main" xmlns:m="http://schemas.openxmlformats.org/officeDocument/2006/math" xmlns="" val="1"/>
+                <ma14:wrappingTextBoxFlag xmlns="" xmlns:m="http://schemas.openxmlformats.org/officeDocument/2006/math" xmlns:a14="http://schemas.microsoft.com/office/drawing/2010/main" xmlns:ma14="http://schemas.microsoft.com/office/mac/drawingml/2011/main" val="1"/>
               </a:ext>
             </a:extLst>
           </p:spPr>
@@ -7234,7 +7234,7 @@
             <a:effectLst/>
             <a:extLst>
               <a:ext uri="{C572A759-6A51-4108-AA02-DFA0A04FC94B}">
-                <ma14:wrappingTextBoxFlag xmlns:ma14="http://schemas.microsoft.com/office/mac/drawingml/2011/main" xmlns:a14="http://schemas.microsoft.com/office/drawing/2010/main" xmlns:m="http://schemas.openxmlformats.org/officeDocument/2006/math" xmlns="" val="1"/>
+                <ma14:wrappingTextBoxFlag xmlns="" xmlns:m="http://schemas.openxmlformats.org/officeDocument/2006/math" xmlns:a14="http://schemas.microsoft.com/office/drawing/2010/main" xmlns:ma14="http://schemas.microsoft.com/office/mac/drawingml/2011/main" val="1"/>
               </a:ext>
             </a:extLst>
           </p:spPr>
@@ -7356,7 +7356,7 @@
             <a:effectLst/>
             <a:extLst>
               <a:ext uri="{C572A759-6A51-4108-AA02-DFA0A04FC94B}">
-                <ma14:wrappingTextBoxFlag xmlns:ma14="http://schemas.microsoft.com/office/mac/drawingml/2011/main" xmlns:a14="http://schemas.microsoft.com/office/drawing/2010/main" xmlns:m="http://schemas.openxmlformats.org/officeDocument/2006/math" xmlns="" val="1"/>
+                <ma14:wrappingTextBoxFlag xmlns="" xmlns:m="http://schemas.openxmlformats.org/officeDocument/2006/math" xmlns:a14="http://schemas.microsoft.com/office/drawing/2010/main" xmlns:ma14="http://schemas.microsoft.com/office/mac/drawingml/2011/main" val="1"/>
               </a:ext>
             </a:extLst>
           </p:spPr>
@@ -7412,7 +7412,7 @@
             <a:effectLst/>
             <a:extLst>
               <a:ext uri="{C572A759-6A51-4108-AA02-DFA0A04FC94B}">
-                <ma14:wrappingTextBoxFlag xmlns:ma14="http://schemas.microsoft.com/office/mac/drawingml/2011/main" xmlns:a14="http://schemas.microsoft.com/office/drawing/2010/main" xmlns:m="http://schemas.openxmlformats.org/officeDocument/2006/math" xmlns="" val="1"/>
+                <ma14:wrappingTextBoxFlag xmlns="" xmlns:m="http://schemas.openxmlformats.org/officeDocument/2006/math" xmlns:a14="http://schemas.microsoft.com/office/drawing/2010/main" xmlns:ma14="http://schemas.microsoft.com/office/mac/drawingml/2011/main" val="1"/>
               </a:ext>
             </a:extLst>
           </p:spPr>
@@ -7534,7 +7534,7 @@
             <a:effectLst/>
             <a:extLst>
               <a:ext uri="{C572A759-6A51-4108-AA02-DFA0A04FC94B}">
-                <ma14:wrappingTextBoxFlag xmlns:ma14="http://schemas.microsoft.com/office/mac/drawingml/2011/main" xmlns:a14="http://schemas.microsoft.com/office/drawing/2010/main" xmlns:m="http://schemas.openxmlformats.org/officeDocument/2006/math" xmlns="" val="1"/>
+                <ma14:wrappingTextBoxFlag xmlns="" xmlns:m="http://schemas.openxmlformats.org/officeDocument/2006/math" xmlns:a14="http://schemas.microsoft.com/office/drawing/2010/main" xmlns:ma14="http://schemas.microsoft.com/office/mac/drawingml/2011/main" val="1"/>
               </a:ext>
             </a:extLst>
           </p:spPr>
@@ -7585,7 +7585,7 @@
             <a:effectLst/>
             <a:extLst>
               <a:ext uri="{C572A759-6A51-4108-AA02-DFA0A04FC94B}">
-                <ma14:wrappingTextBoxFlag xmlns:ma14="http://schemas.microsoft.com/office/mac/drawingml/2011/main" xmlns:a14="http://schemas.microsoft.com/office/drawing/2010/main" xmlns:m="http://schemas.openxmlformats.org/officeDocument/2006/math" xmlns="" val="1"/>
+                <ma14:wrappingTextBoxFlag xmlns="" xmlns:m="http://schemas.openxmlformats.org/officeDocument/2006/math" xmlns:a14="http://schemas.microsoft.com/office/drawing/2010/main" xmlns:ma14="http://schemas.microsoft.com/office/mac/drawingml/2011/main" val="1"/>
               </a:ext>
             </a:extLst>
           </p:spPr>
@@ -7711,7 +7711,7 @@
             <a:effectLst/>
             <a:extLst>
               <a:ext uri="{C572A759-6A51-4108-AA02-DFA0A04FC94B}">
-                <ma14:wrappingTextBoxFlag xmlns:ma14="http://schemas.microsoft.com/office/mac/drawingml/2011/main" xmlns:a14="http://schemas.microsoft.com/office/drawing/2010/main" xmlns:m="http://schemas.openxmlformats.org/officeDocument/2006/math" xmlns="" val="1"/>
+                <ma14:wrappingTextBoxFlag xmlns="" xmlns:m="http://schemas.openxmlformats.org/officeDocument/2006/math" xmlns:a14="http://schemas.microsoft.com/office/drawing/2010/main" xmlns:ma14="http://schemas.microsoft.com/office/mac/drawingml/2011/main" val="1"/>
               </a:ext>
             </a:extLst>
           </p:spPr>
@@ -7767,7 +7767,7 @@
             <a:effectLst/>
             <a:extLst>
               <a:ext uri="{C572A759-6A51-4108-AA02-DFA0A04FC94B}">
-                <ma14:wrappingTextBoxFlag xmlns:ma14="http://schemas.microsoft.com/office/mac/drawingml/2011/main" xmlns:a14="http://schemas.microsoft.com/office/drawing/2010/main" xmlns:m="http://schemas.openxmlformats.org/officeDocument/2006/math" xmlns="" val="1"/>
+                <ma14:wrappingTextBoxFlag xmlns="" xmlns:m="http://schemas.openxmlformats.org/officeDocument/2006/math" xmlns:a14="http://schemas.microsoft.com/office/drawing/2010/main" xmlns:ma14="http://schemas.microsoft.com/office/mac/drawingml/2011/main" val="1"/>
               </a:ext>
             </a:extLst>
           </p:spPr>
@@ -7889,7 +7889,7 @@
             <a:effectLst/>
             <a:extLst>
               <a:ext uri="{C572A759-6A51-4108-AA02-DFA0A04FC94B}">
-                <ma14:wrappingTextBoxFlag xmlns:ma14="http://schemas.microsoft.com/office/mac/drawingml/2011/main" xmlns:a14="http://schemas.microsoft.com/office/drawing/2010/main" xmlns:m="http://schemas.openxmlformats.org/officeDocument/2006/math" xmlns="" val="1"/>
+                <ma14:wrappingTextBoxFlag xmlns="" xmlns:m="http://schemas.openxmlformats.org/officeDocument/2006/math" xmlns:a14="http://schemas.microsoft.com/office/drawing/2010/main" xmlns:ma14="http://schemas.microsoft.com/office/mac/drawingml/2011/main" val="1"/>
               </a:ext>
             </a:extLst>
           </p:spPr>
@@ -8012,7 +8012,7 @@
               <a:effectLst/>
               <a:extLst>
                 <a:ext uri="{C572A759-6A51-4108-AA02-DFA0A04FC94B}">
-                  <ma14:wrappingTextBoxFlag xmlns:ma14="http://schemas.microsoft.com/office/mac/drawingml/2011/main" xmlns:a14="http://schemas.microsoft.com/office/drawing/2010/main" xmlns:m="http://schemas.openxmlformats.org/officeDocument/2006/math" xmlns="" val="1"/>
+                  <ma14:wrappingTextBoxFlag xmlns="" xmlns:m="http://schemas.openxmlformats.org/officeDocument/2006/math" xmlns:a14="http://schemas.microsoft.com/office/drawing/2010/main" xmlns:ma14="http://schemas.microsoft.com/office/mac/drawingml/2011/main" val="1"/>
                 </a:ext>
               </a:extLst>
             </p:spPr>
@@ -8124,7 +8124,7 @@
               <a:effectLst/>
               <a:extLst>
                 <a:ext uri="{C572A759-6A51-4108-AA02-DFA0A04FC94B}">
-                  <ma14:wrappingTextBoxFlag xmlns:ma14="http://schemas.microsoft.com/office/mac/drawingml/2011/main" xmlns:a14="http://schemas.microsoft.com/office/drawing/2010/main" xmlns:m="http://schemas.openxmlformats.org/officeDocument/2006/math" xmlns="" val="1"/>
+                  <ma14:wrappingTextBoxFlag xmlns="" xmlns:m="http://schemas.openxmlformats.org/officeDocument/2006/math" xmlns:a14="http://schemas.microsoft.com/office/drawing/2010/main" xmlns:ma14="http://schemas.microsoft.com/office/mac/drawingml/2011/main" val="1"/>
                 </a:ext>
               </a:extLst>
             </p:spPr>
@@ -8175,7 +8175,7 @@
             <a:effectLst/>
             <a:extLst>
               <a:ext uri="{C572A759-6A51-4108-AA02-DFA0A04FC94B}">
-                <ma14:wrappingTextBoxFlag xmlns:ma14="http://schemas.microsoft.com/office/mac/drawingml/2011/main" xmlns:a14="http://schemas.microsoft.com/office/drawing/2010/main" xmlns:m="http://schemas.openxmlformats.org/officeDocument/2006/math" xmlns="" val="1"/>
+                <ma14:wrappingTextBoxFlag xmlns="" xmlns:m="http://schemas.openxmlformats.org/officeDocument/2006/math" xmlns:a14="http://schemas.microsoft.com/office/drawing/2010/main" xmlns:ma14="http://schemas.microsoft.com/office/mac/drawingml/2011/main" val="1"/>
               </a:ext>
             </a:extLst>
           </p:spPr>
@@ -8297,7 +8297,7 @@
             <a:effectLst/>
             <a:extLst>
               <a:ext uri="{C572A759-6A51-4108-AA02-DFA0A04FC94B}">
-                <ma14:wrappingTextBoxFlag xmlns:ma14="http://schemas.microsoft.com/office/mac/drawingml/2011/main" xmlns:a14="http://schemas.microsoft.com/office/drawing/2010/main" xmlns:m="http://schemas.openxmlformats.org/officeDocument/2006/math" xmlns="" val="1"/>
+                <ma14:wrappingTextBoxFlag xmlns="" xmlns:m="http://schemas.openxmlformats.org/officeDocument/2006/math" xmlns:a14="http://schemas.microsoft.com/office/drawing/2010/main" xmlns:ma14="http://schemas.microsoft.com/office/mac/drawingml/2011/main" val="1"/>
               </a:ext>
             </a:extLst>
           </p:spPr>
@@ -8408,7 +8408,7 @@
               <a:effectLst/>
               <a:extLst>
                 <a:ext uri="{C572A759-6A51-4108-AA02-DFA0A04FC94B}">
-                  <ma14:wrappingTextBoxFlag xmlns:ma14="http://schemas.microsoft.com/office/mac/drawingml/2011/main" xmlns:a14="http://schemas.microsoft.com/office/drawing/2010/main" xmlns:m="http://schemas.openxmlformats.org/officeDocument/2006/math" xmlns="" val="1"/>
+                  <ma14:wrappingTextBoxFlag xmlns="" xmlns:m="http://schemas.openxmlformats.org/officeDocument/2006/math" xmlns:a14="http://schemas.microsoft.com/office/drawing/2010/main" xmlns:ma14="http://schemas.microsoft.com/office/mac/drawingml/2011/main" val="1"/>
                 </a:ext>
               </a:extLst>
             </p:spPr>
@@ -8519,7 +8519,7 @@
               <a:effectLst/>
               <a:extLst>
                 <a:ext uri="{C572A759-6A51-4108-AA02-DFA0A04FC94B}">
-                  <ma14:wrappingTextBoxFlag xmlns:ma14="http://schemas.microsoft.com/office/mac/drawingml/2011/main" xmlns:a14="http://schemas.microsoft.com/office/drawing/2010/main" xmlns:m="http://schemas.openxmlformats.org/officeDocument/2006/math" xmlns="" val="1"/>
+                  <ma14:wrappingTextBoxFlag xmlns="" xmlns:m="http://schemas.openxmlformats.org/officeDocument/2006/math" xmlns:a14="http://schemas.microsoft.com/office/drawing/2010/main" xmlns:ma14="http://schemas.microsoft.com/office/mac/drawingml/2011/main" val="1"/>
                 </a:ext>
               </a:extLst>
             </p:spPr>
@@ -8570,7 +8570,7 @@
             <a:effectLst/>
             <a:extLst>
               <a:ext uri="{C572A759-6A51-4108-AA02-DFA0A04FC94B}">
-                <ma14:wrappingTextBoxFlag xmlns:ma14="http://schemas.microsoft.com/office/mac/drawingml/2011/main" xmlns:a14="http://schemas.microsoft.com/office/drawing/2010/main" xmlns:m="http://schemas.openxmlformats.org/officeDocument/2006/math" xmlns="" val="1"/>
+                <ma14:wrappingTextBoxFlag xmlns="" xmlns:m="http://schemas.openxmlformats.org/officeDocument/2006/math" xmlns:a14="http://schemas.microsoft.com/office/drawing/2010/main" xmlns:ma14="http://schemas.microsoft.com/office/mac/drawingml/2011/main" val="1"/>
               </a:ext>
             </a:extLst>
           </p:spPr>
@@ -8692,7 +8692,7 @@
             <a:effectLst/>
             <a:extLst>
               <a:ext uri="{C572A759-6A51-4108-AA02-DFA0A04FC94B}">
-                <ma14:wrappingTextBoxFlag xmlns:ma14="http://schemas.microsoft.com/office/mac/drawingml/2011/main" xmlns:a14="http://schemas.microsoft.com/office/drawing/2010/main" xmlns:m="http://schemas.openxmlformats.org/officeDocument/2006/math" xmlns="" val="1"/>
+                <ma14:wrappingTextBoxFlag xmlns="" xmlns:m="http://schemas.openxmlformats.org/officeDocument/2006/math" xmlns:a14="http://schemas.microsoft.com/office/drawing/2010/main" xmlns:ma14="http://schemas.microsoft.com/office/mac/drawingml/2011/main" val="1"/>
               </a:ext>
             </a:extLst>
           </p:spPr>
@@ -8816,7 +8816,7 @@
               <a:effectLst/>
               <a:extLst>
                 <a:ext uri="{C572A759-6A51-4108-AA02-DFA0A04FC94B}">
-                  <ma14:wrappingTextBoxFlag xmlns:ma14="http://schemas.microsoft.com/office/mac/drawingml/2011/main" xmlns:a14="http://schemas.microsoft.com/office/drawing/2010/main" xmlns:m="http://schemas.openxmlformats.org/officeDocument/2006/math" xmlns="" val="1"/>
+                  <ma14:wrappingTextBoxFlag xmlns="" xmlns:m="http://schemas.openxmlformats.org/officeDocument/2006/math" xmlns:a14="http://schemas.microsoft.com/office/drawing/2010/main" xmlns:ma14="http://schemas.microsoft.com/office/mac/drawingml/2011/main" val="1"/>
                 </a:ext>
               </a:extLst>
             </p:spPr>
@@ -8927,7 +8927,7 @@
               <a:effectLst/>
               <a:extLst>
                 <a:ext uri="{C572A759-6A51-4108-AA02-DFA0A04FC94B}">
-                  <ma14:wrappingTextBoxFlag xmlns:ma14="http://schemas.microsoft.com/office/mac/drawingml/2011/main" xmlns:a14="http://schemas.microsoft.com/office/drawing/2010/main" xmlns:m="http://schemas.openxmlformats.org/officeDocument/2006/math" xmlns="" val="1"/>
+                  <ma14:wrappingTextBoxFlag xmlns="" xmlns:m="http://schemas.openxmlformats.org/officeDocument/2006/math" xmlns:a14="http://schemas.microsoft.com/office/drawing/2010/main" xmlns:ma14="http://schemas.microsoft.com/office/mac/drawingml/2011/main" val="1"/>
                 </a:ext>
               </a:extLst>
             </p:spPr>
@@ -8978,7 +8978,7 @@
             <a:effectLst/>
             <a:extLst>
               <a:ext uri="{C572A759-6A51-4108-AA02-DFA0A04FC94B}">
-                <ma14:wrappingTextBoxFlag xmlns:ma14="http://schemas.microsoft.com/office/mac/drawingml/2011/main" xmlns:a14="http://schemas.microsoft.com/office/drawing/2010/main" xmlns:m="http://schemas.openxmlformats.org/officeDocument/2006/math" xmlns="" val="1"/>
+                <ma14:wrappingTextBoxFlag xmlns="" xmlns:m="http://schemas.openxmlformats.org/officeDocument/2006/math" xmlns:a14="http://schemas.microsoft.com/office/drawing/2010/main" xmlns:ma14="http://schemas.microsoft.com/office/mac/drawingml/2011/main" val="1"/>
               </a:ext>
             </a:extLst>
           </p:spPr>
@@ -9031,7 +9031,7 @@
           </a:ln>
           <a:extLst>
             <a:ext uri="{C572A759-6A51-4108-AA02-DFA0A04FC94B}">
-              <ma14:wrappingTextBoxFlag xmlns:ma14="http://schemas.microsoft.com/office/mac/drawingml/2011/main" xmlns:a14="http://schemas.microsoft.com/office/drawing/2010/main" xmlns:m="http://schemas.openxmlformats.org/officeDocument/2006/math" xmlns="" val="1"/>
+              <ma14:wrappingTextBoxFlag xmlns="" xmlns:m="http://schemas.openxmlformats.org/officeDocument/2006/math" xmlns:a14="http://schemas.microsoft.com/office/drawing/2010/main" xmlns:ma14="http://schemas.microsoft.com/office/mac/drawingml/2011/main" val="1"/>
             </a:ext>
           </a:extLst>
         </p:spPr>
@@ -9109,7 +9109,7 @@
             </a:r>
             <a:r>
               <a:rPr lang="es-ES" dirty="0"/>
-              <a:t> 1 - 3</a:t>
+              <a:t> 0 - 3</a:t>
             </a:r>
             <a:endParaRPr dirty="0"/>
           </a:p>
@@ -9188,7 +9188,7 @@
           </a:ln>
           <a:extLst>
             <a:ext uri="{C572A759-6A51-4108-AA02-DFA0A04FC94B}">
-              <ma14:wrappingTextBoxFlag xmlns:ma14="http://schemas.microsoft.com/office/mac/drawingml/2011/main" xmlns:a14="http://schemas.microsoft.com/office/drawing/2010/main" xmlns:m="http://schemas.openxmlformats.org/officeDocument/2006/math" xmlns="" val="1"/>
+              <ma14:wrappingTextBoxFlag xmlns="" xmlns:m="http://schemas.openxmlformats.org/officeDocument/2006/math" xmlns:a14="http://schemas.microsoft.com/office/drawing/2010/main" xmlns:ma14="http://schemas.microsoft.com/office/mac/drawingml/2011/main" val="1"/>
             </a:ext>
           </a:extLst>
         </p:spPr>
@@ -9260,7 +9260,7 @@
           </a:ln>
           <a:extLst>
             <a:ext uri="{C572A759-6A51-4108-AA02-DFA0A04FC94B}">
-              <ma14:wrappingTextBoxFlag xmlns:ma14="http://schemas.microsoft.com/office/mac/drawingml/2011/main" xmlns:a14="http://schemas.microsoft.com/office/drawing/2010/main" xmlns:m="http://schemas.openxmlformats.org/officeDocument/2006/math" xmlns="" val="1"/>
+              <ma14:wrappingTextBoxFlag xmlns="" xmlns:m="http://schemas.openxmlformats.org/officeDocument/2006/math" xmlns:a14="http://schemas.microsoft.com/office/drawing/2010/main" xmlns:ma14="http://schemas.microsoft.com/office/mac/drawingml/2011/main" val="1"/>
             </a:ext>
           </a:extLst>
         </p:spPr>
@@ -9332,7 +9332,7 @@
           </a:ln>
           <a:extLst>
             <a:ext uri="{C572A759-6A51-4108-AA02-DFA0A04FC94B}">
-              <ma14:wrappingTextBoxFlag xmlns:ma14="http://schemas.microsoft.com/office/mac/drawingml/2011/main" xmlns:a14="http://schemas.microsoft.com/office/drawing/2010/main" xmlns:m="http://schemas.openxmlformats.org/officeDocument/2006/math" xmlns="" val="1"/>
+              <ma14:wrappingTextBoxFlag xmlns="" xmlns:m="http://schemas.openxmlformats.org/officeDocument/2006/math" xmlns:a14="http://schemas.microsoft.com/office/drawing/2010/main" xmlns:ma14="http://schemas.microsoft.com/office/mac/drawingml/2011/main" val="1"/>
             </a:ext>
           </a:extLst>
         </p:spPr>
@@ -9517,7 +9517,7 @@
           </a:ln>
           <a:extLst>
             <a:ext uri="{C572A759-6A51-4108-AA02-DFA0A04FC94B}">
-              <ma14:wrappingTextBoxFlag xmlns:ma14="http://schemas.microsoft.com/office/mac/drawingml/2011/main" xmlns:a14="http://schemas.microsoft.com/office/drawing/2010/main" xmlns:m="http://schemas.openxmlformats.org/officeDocument/2006/math" xmlns="" val="1"/>
+              <ma14:wrappingTextBoxFlag xmlns="" xmlns:m="http://schemas.openxmlformats.org/officeDocument/2006/math" xmlns:a14="http://schemas.microsoft.com/office/drawing/2010/main" xmlns:ma14="http://schemas.microsoft.com/office/mac/drawingml/2011/main" val="1"/>
             </a:ext>
           </a:extLst>
         </p:spPr>
@@ -9607,7 +9607,7 @@
           </a:ln>
           <a:extLst>
             <a:ext uri="{C572A759-6A51-4108-AA02-DFA0A04FC94B}">
-              <ma14:wrappingTextBoxFlag xmlns:ma14="http://schemas.microsoft.com/office/mac/drawingml/2011/main" xmlns:a14="http://schemas.microsoft.com/office/drawing/2010/main" xmlns:m="http://schemas.openxmlformats.org/officeDocument/2006/math" xmlns="" val="1"/>
+              <ma14:wrappingTextBoxFlag xmlns="" xmlns:m="http://schemas.openxmlformats.org/officeDocument/2006/math" xmlns:a14="http://schemas.microsoft.com/office/drawing/2010/main" xmlns:ma14="http://schemas.microsoft.com/office/mac/drawingml/2011/main" val="1"/>
             </a:ext>
           </a:extLst>
         </p:spPr>
@@ -9656,7 +9656,7 @@
           </a:ln>
           <a:extLst>
             <a:ext uri="{C572A759-6A51-4108-AA02-DFA0A04FC94B}">
-              <ma14:wrappingTextBoxFlag xmlns:ma14="http://schemas.microsoft.com/office/mac/drawingml/2011/main" xmlns:a14="http://schemas.microsoft.com/office/drawing/2010/main" xmlns:m="http://schemas.openxmlformats.org/officeDocument/2006/math" xmlns="" val="1"/>
+              <ma14:wrappingTextBoxFlag xmlns="" xmlns:m="http://schemas.openxmlformats.org/officeDocument/2006/math" xmlns:a14="http://schemas.microsoft.com/office/drawing/2010/main" xmlns:ma14="http://schemas.microsoft.com/office/mac/drawingml/2011/main" val="1"/>
             </a:ext>
           </a:extLst>
         </p:spPr>
@@ -9705,7 +9705,7 @@
           </a:ln>
           <a:extLst>
             <a:ext uri="{C572A759-6A51-4108-AA02-DFA0A04FC94B}">
-              <ma14:wrappingTextBoxFlag xmlns:ma14="http://schemas.microsoft.com/office/mac/drawingml/2011/main" xmlns:a14="http://schemas.microsoft.com/office/drawing/2010/main" xmlns:m="http://schemas.openxmlformats.org/officeDocument/2006/math" xmlns="" val="1"/>
+              <ma14:wrappingTextBoxFlag xmlns="" xmlns:m="http://schemas.openxmlformats.org/officeDocument/2006/math" xmlns:a14="http://schemas.microsoft.com/office/drawing/2010/main" xmlns:ma14="http://schemas.microsoft.com/office/mac/drawingml/2011/main" val="1"/>
             </a:ext>
           </a:extLst>
         </p:spPr>
@@ -9760,7 +9760,7 @@
           </a:ln>
           <a:extLst>
             <a:ext uri="{C572A759-6A51-4108-AA02-DFA0A04FC94B}">
-              <ma14:wrappingTextBoxFlag xmlns:ma14="http://schemas.microsoft.com/office/mac/drawingml/2011/main" xmlns:a14="http://schemas.microsoft.com/office/drawing/2010/main" xmlns:m="http://schemas.openxmlformats.org/officeDocument/2006/math" xmlns="" val="1"/>
+              <ma14:wrappingTextBoxFlag xmlns="" xmlns:m="http://schemas.openxmlformats.org/officeDocument/2006/math" xmlns:a14="http://schemas.microsoft.com/office/drawing/2010/main" xmlns:ma14="http://schemas.microsoft.com/office/mac/drawingml/2011/main" val="1"/>
             </a:ext>
           </a:extLst>
         </p:spPr>
@@ -10003,7 +10003,7 @@
             <a:effectLst/>
             <a:extLst>
               <a:ext uri="{C572A759-6A51-4108-AA02-DFA0A04FC94B}">
-                <ma14:wrappingTextBoxFlag xmlns:ma14="http://schemas.microsoft.com/office/mac/drawingml/2011/main" xmlns:a14="http://schemas.microsoft.com/office/drawing/2010/main" xmlns:m="http://schemas.openxmlformats.org/officeDocument/2006/math" xmlns="" val="1"/>
+                <ma14:wrappingTextBoxFlag xmlns="" xmlns:m="http://schemas.openxmlformats.org/officeDocument/2006/math" xmlns:a14="http://schemas.microsoft.com/office/drawing/2010/main" xmlns:ma14="http://schemas.microsoft.com/office/mac/drawingml/2011/main" val="1"/>
               </a:ext>
             </a:extLst>
           </p:spPr>
@@ -10065,7 +10065,7 @@
             <a:effectLst/>
             <a:extLst>
               <a:ext uri="{C572A759-6A51-4108-AA02-DFA0A04FC94B}">
-                <ma14:wrappingTextBoxFlag xmlns:ma14="http://schemas.microsoft.com/office/mac/drawingml/2011/main" xmlns:a14="http://schemas.microsoft.com/office/drawing/2010/main" xmlns:m="http://schemas.openxmlformats.org/officeDocument/2006/math" xmlns="" val="1"/>
+                <ma14:wrappingTextBoxFlag xmlns="" xmlns:m="http://schemas.openxmlformats.org/officeDocument/2006/math" xmlns:a14="http://schemas.microsoft.com/office/drawing/2010/main" xmlns:ma14="http://schemas.microsoft.com/office/mac/drawingml/2011/main" val="1"/>
               </a:ext>
             </a:extLst>
           </p:spPr>
@@ -10549,7 +10549,7 @@
           <a:effectLst/>
           <a:extLst>
             <a:ext uri="{C572A759-6A51-4108-AA02-DFA0A04FC94B}">
-              <ma14:wrappingTextBoxFlag xmlns:ma14="http://schemas.microsoft.com/office/mac/drawingml/2011/main" xmlns:a14="http://schemas.microsoft.com/office/drawing/2010/main" xmlns:m="http://schemas.openxmlformats.org/officeDocument/2006/math" xmlns="" val="1"/>
+              <ma14:wrappingTextBoxFlag xmlns="" xmlns:m="http://schemas.openxmlformats.org/officeDocument/2006/math" xmlns:a14="http://schemas.microsoft.com/office/drawing/2010/main" xmlns:ma14="http://schemas.microsoft.com/office/mac/drawingml/2011/main" val="1"/>
             </a:ext>
           </a:extLst>
         </p:spPr>
@@ -10598,7 +10598,7 @@
           </a:ln>
           <a:extLst>
             <a:ext uri="{C572A759-6A51-4108-AA02-DFA0A04FC94B}">
-              <ma14:wrappingTextBoxFlag xmlns:ma14="http://schemas.microsoft.com/office/mac/drawingml/2011/main" xmlns:a14="http://schemas.microsoft.com/office/drawing/2010/main" xmlns:m="http://schemas.openxmlformats.org/officeDocument/2006/math" xmlns="" val="1"/>
+              <ma14:wrappingTextBoxFlag xmlns="" xmlns:m="http://schemas.openxmlformats.org/officeDocument/2006/math" xmlns:a14="http://schemas.microsoft.com/office/drawing/2010/main" xmlns:ma14="http://schemas.microsoft.com/office/mac/drawingml/2011/main" val="1"/>
             </a:ext>
           </a:extLst>
         </p:spPr>
@@ -10671,7 +10671,7 @@
           <a:effectLst/>
           <a:extLst>
             <a:ext uri="{C572A759-6A51-4108-AA02-DFA0A04FC94B}">
-              <ma14:wrappingTextBoxFlag xmlns:ma14="http://schemas.microsoft.com/office/mac/drawingml/2011/main" xmlns:a14="http://schemas.microsoft.com/office/drawing/2010/main" xmlns:m="http://schemas.openxmlformats.org/officeDocument/2006/math" xmlns="" val="1"/>
+              <ma14:wrappingTextBoxFlag xmlns="" xmlns:m="http://schemas.openxmlformats.org/officeDocument/2006/math" xmlns:a14="http://schemas.microsoft.com/office/drawing/2010/main" xmlns:ma14="http://schemas.microsoft.com/office/mac/drawingml/2011/main" val="1"/>
             </a:ext>
           </a:extLst>
         </p:spPr>
@@ -11005,7 +11005,7 @@
           </a:ln>
           <a:extLst>
             <a:ext uri="{C572A759-6A51-4108-AA02-DFA0A04FC94B}">
-              <ma14:wrappingTextBoxFlag xmlns:ma14="http://schemas.microsoft.com/office/mac/drawingml/2011/main" xmlns:a14="http://schemas.microsoft.com/office/drawing/2010/main" xmlns:m="http://schemas.openxmlformats.org/officeDocument/2006/math" xmlns="" val="1"/>
+              <ma14:wrappingTextBoxFlag xmlns="" xmlns:m="http://schemas.openxmlformats.org/officeDocument/2006/math" xmlns:a14="http://schemas.microsoft.com/office/drawing/2010/main" xmlns:ma14="http://schemas.microsoft.com/office/mac/drawingml/2011/main" val="1"/>
             </a:ext>
           </a:extLst>
         </p:spPr>
@@ -11302,7 +11302,7 @@
           </a:ln>
           <a:extLst>
             <a:ext uri="{C572A759-6A51-4108-AA02-DFA0A04FC94B}">
-              <ma14:wrappingTextBoxFlag xmlns:ma14="http://schemas.microsoft.com/office/mac/drawingml/2011/main" xmlns:a14="http://schemas.microsoft.com/office/drawing/2010/main" xmlns:m="http://schemas.openxmlformats.org/officeDocument/2006/math" xmlns="" val="1"/>
+              <ma14:wrappingTextBoxFlag xmlns="" xmlns:m="http://schemas.openxmlformats.org/officeDocument/2006/math" xmlns:a14="http://schemas.microsoft.com/office/drawing/2010/main" xmlns:ma14="http://schemas.microsoft.com/office/mac/drawingml/2011/main" val="1"/>
             </a:ext>
           </a:extLst>
         </p:spPr>
@@ -11836,7 +11836,7 @@
           </a:ln>
           <a:extLst>
             <a:ext uri="{C572A759-6A51-4108-AA02-DFA0A04FC94B}">
-              <ma14:wrappingTextBoxFlag xmlns:ma14="http://schemas.microsoft.com/office/mac/drawingml/2011/main" xmlns:a14="http://schemas.microsoft.com/office/drawing/2010/main" xmlns:m="http://schemas.openxmlformats.org/officeDocument/2006/math" xmlns="" val="1"/>
+              <ma14:wrappingTextBoxFlag xmlns="" xmlns:m="http://schemas.openxmlformats.org/officeDocument/2006/math" xmlns:a14="http://schemas.microsoft.com/office/drawing/2010/main" xmlns:ma14="http://schemas.microsoft.com/office/mac/drawingml/2011/main" val="1"/>
             </a:ext>
           </a:extLst>
         </p:spPr>
@@ -12109,7 +12109,7 @@
             <a:effectLst/>
             <a:extLst>
               <a:ext uri="{C572A759-6A51-4108-AA02-DFA0A04FC94B}">
-                <ma14:wrappingTextBoxFlag xmlns:ma14="http://schemas.microsoft.com/office/mac/drawingml/2011/main" xmlns:a14="http://schemas.microsoft.com/office/drawing/2010/main" xmlns:m="http://schemas.openxmlformats.org/officeDocument/2006/math" xmlns="" val="1"/>
+                <ma14:wrappingTextBoxFlag xmlns="" xmlns:m="http://schemas.openxmlformats.org/officeDocument/2006/math" xmlns:a14="http://schemas.microsoft.com/office/drawing/2010/main" xmlns:ma14="http://schemas.microsoft.com/office/mac/drawingml/2011/main" val="1"/>
               </a:ext>
             </a:extLst>
           </p:spPr>
@@ -12159,7 +12159,7 @@
             <a:effectLst/>
             <a:extLst>
               <a:ext uri="{C572A759-6A51-4108-AA02-DFA0A04FC94B}">
-                <ma14:wrappingTextBoxFlag xmlns:ma14="http://schemas.microsoft.com/office/mac/drawingml/2011/main" xmlns:a14="http://schemas.microsoft.com/office/drawing/2010/main" xmlns:m="http://schemas.openxmlformats.org/officeDocument/2006/math" xmlns="" val="1"/>
+                <ma14:wrappingTextBoxFlag xmlns="" xmlns:m="http://schemas.openxmlformats.org/officeDocument/2006/math" xmlns:a14="http://schemas.microsoft.com/office/drawing/2010/main" xmlns:ma14="http://schemas.microsoft.com/office/mac/drawingml/2011/main" val="1"/>
               </a:ext>
             </a:extLst>
           </p:spPr>
@@ -12209,7 +12209,7 @@
             <a:effectLst/>
             <a:extLst>
               <a:ext uri="{C572A759-6A51-4108-AA02-DFA0A04FC94B}">
-                <ma14:wrappingTextBoxFlag xmlns:ma14="http://schemas.microsoft.com/office/mac/drawingml/2011/main" xmlns:a14="http://schemas.microsoft.com/office/drawing/2010/main" xmlns:m="http://schemas.openxmlformats.org/officeDocument/2006/math" xmlns="" val="1"/>
+                <ma14:wrappingTextBoxFlag xmlns="" xmlns:m="http://schemas.openxmlformats.org/officeDocument/2006/math" xmlns:a14="http://schemas.microsoft.com/office/drawing/2010/main" xmlns:ma14="http://schemas.microsoft.com/office/mac/drawingml/2011/main" val="1"/>
               </a:ext>
             </a:extLst>
           </p:spPr>
@@ -12259,7 +12259,7 @@
             <a:effectLst/>
             <a:extLst>
               <a:ext uri="{C572A759-6A51-4108-AA02-DFA0A04FC94B}">
-                <ma14:wrappingTextBoxFlag xmlns:ma14="http://schemas.microsoft.com/office/mac/drawingml/2011/main" xmlns:a14="http://schemas.microsoft.com/office/drawing/2010/main" xmlns:m="http://schemas.openxmlformats.org/officeDocument/2006/math" xmlns="" val="1"/>
+                <ma14:wrappingTextBoxFlag xmlns="" xmlns:m="http://schemas.openxmlformats.org/officeDocument/2006/math" xmlns:a14="http://schemas.microsoft.com/office/drawing/2010/main" xmlns:ma14="http://schemas.microsoft.com/office/mac/drawingml/2011/main" val="1"/>
               </a:ext>
             </a:extLst>
           </p:spPr>

</xml_diff>